<commit_message>
final changes in ppt
</commit_message>
<xml_diff>
--- a/ppt github.pptx
+++ b/ppt github.pptx
@@ -8,14 +8,14 @@
     <p:sldId id="256" r:id="rId2"/>
     <p:sldId id="257" r:id="rId3"/>
     <p:sldId id="258" r:id="rId4"/>
-    <p:sldId id="259" r:id="rId5"/>
-    <p:sldId id="260" r:id="rId6"/>
-    <p:sldId id="261" r:id="rId7"/>
-    <p:sldId id="262" r:id="rId8"/>
-    <p:sldId id="263" r:id="rId9"/>
-    <p:sldId id="264" r:id="rId10"/>
-    <p:sldId id="265" r:id="rId11"/>
-    <p:sldId id="266" r:id="rId12"/>
+    <p:sldId id="269" r:id="rId5"/>
+    <p:sldId id="259" r:id="rId6"/>
+    <p:sldId id="268" r:id="rId7"/>
+    <p:sldId id="261" r:id="rId8"/>
+    <p:sldId id="267" r:id="rId9"/>
+    <p:sldId id="262" r:id="rId10"/>
+    <p:sldId id="263" r:id="rId11"/>
+    <p:sldId id="264" r:id="rId12"/>
   </p:sldIdLst>
   <p:sldSz cx="12192000" cy="6858000"/>
   <p:notesSz cx="6858000" cy="9144000"/>
@@ -116,7 +116,7 @@
   </p:defaultTextStyle>
   <p:extLst>
     <p:ext uri="{521415D9-36F7-43E2-AB2F-B90AF26B5E84}">
-      <p14:sectionLst xmlns:p14="http://schemas.microsoft.com/office/powerpoint/2010/main">
+      <p14:sectionLst xmlns:p14="http://schemas.microsoft.com/office/powerpoint/2010/main" xmlns="">
         <p14:section name="Default Section" id="{84A4C4D4-0678-4EDD-8B6C-F34DB5EF76EC}">
           <p14:sldIdLst>
             <p14:sldId id="256"/>
@@ -480,7 +480,7 @@
             <a:blip r:embed="rId2">
               <a:extLst>
                 <a:ext uri="{28A0092B-C50C-407E-A947-70E740481C1C}">
-                  <a14:useLocalDpi xmlns:a14="http://schemas.microsoft.com/office/drawing/2010/main" val="0"/>
+                  <a14:useLocalDpi xmlns:a14="http://schemas.microsoft.com/office/drawing/2010/main" xmlns="" val="0"/>
                 </a:ext>
               </a:extLst>
             </a:blip>
@@ -544,7 +544,7 @@
             <a:blip r:embed="rId3">
               <a:extLst>
                 <a:ext uri="{28A0092B-C50C-407E-A947-70E740481C1C}">
-                  <a14:useLocalDpi xmlns:a14="http://schemas.microsoft.com/office/drawing/2010/main" val="0"/>
+                  <a14:useLocalDpi xmlns:a14="http://schemas.microsoft.com/office/drawing/2010/main" xmlns="" val="0"/>
                 </a:ext>
               </a:extLst>
             </a:blip>
@@ -573,7 +573,7 @@
             <a:blip r:embed="rId3">
               <a:extLst>
                 <a:ext uri="{28A0092B-C50C-407E-A947-70E740481C1C}">
-                  <a14:useLocalDpi xmlns:a14="http://schemas.microsoft.com/office/drawing/2010/main" val="0"/>
+                  <a14:useLocalDpi xmlns:a14="http://schemas.microsoft.com/office/drawing/2010/main" xmlns="" val="0"/>
                 </a:ext>
               </a:extLst>
             </a:blip>
@@ -768,7 +768,8 @@
           <a:p>
             <a:fld id="{B79ABB67-168E-4905-8090-49366666A8FD}" type="datetimeFigureOut">
               <a:rPr lang="en-IN" smtClean="0"/>
-              <a:t>21-05-2023</a:t>
+              <a:pPr/>
+              <a:t>22-05-2023</a:t>
             </a:fld>
             <a:endParaRPr lang="en-IN"/>
           </a:p>
@@ -820,6 +821,7 @@
           <a:p>
             <a:fld id="{E7DEFBB0-DAA9-400D-8362-8BC3D45340DE}" type="slidenum">
               <a:rPr lang="en-IN" smtClean="0"/>
+              <a:pPr/>
               <a:t>‹#›</a:t>
             </a:fld>
             <a:endParaRPr lang="en-IN"/>
@@ -859,7 +861,7 @@
     </p:spTree>
     <p:extLst>
       <p:ext uri="{BB962C8B-B14F-4D97-AF65-F5344CB8AC3E}">
-        <p14:creationId xmlns:p14="http://schemas.microsoft.com/office/powerpoint/2010/main" val="1188044414"/>
+        <p14:creationId xmlns:p14="http://schemas.microsoft.com/office/powerpoint/2010/main" xmlns="" val="1188044414"/>
       </p:ext>
     </p:extLst>
   </p:cSld>
@@ -1092,7 +1094,8 @@
           <a:p>
             <a:fld id="{B79ABB67-168E-4905-8090-49366666A8FD}" type="datetimeFigureOut">
               <a:rPr lang="en-IN" smtClean="0"/>
-              <a:t>21-05-2023</a:t>
+              <a:pPr/>
+              <a:t>22-05-2023</a:t>
             </a:fld>
             <a:endParaRPr lang="en-IN"/>
           </a:p>
@@ -1134,6 +1137,7 @@
           <a:p>
             <a:fld id="{E7DEFBB0-DAA9-400D-8362-8BC3D45340DE}" type="slidenum">
               <a:rPr lang="en-IN" smtClean="0"/>
+              <a:pPr/>
               <a:t>‹#›</a:t>
             </a:fld>
             <a:endParaRPr lang="en-IN"/>
@@ -1143,7 +1147,7 @@
     </p:spTree>
     <p:extLst>
       <p:ext uri="{BB962C8B-B14F-4D97-AF65-F5344CB8AC3E}">
-        <p14:creationId xmlns:p14="http://schemas.microsoft.com/office/powerpoint/2010/main" val="2847324690"/>
+        <p14:creationId xmlns:p14="http://schemas.microsoft.com/office/powerpoint/2010/main" xmlns="" val="2847324690"/>
       </p:ext>
     </p:extLst>
   </p:cSld>
@@ -1340,7 +1344,8 @@
           <a:p>
             <a:fld id="{B79ABB67-168E-4905-8090-49366666A8FD}" type="datetimeFigureOut">
               <a:rPr lang="en-IN" smtClean="0"/>
-              <a:t>21-05-2023</a:t>
+              <a:pPr/>
+              <a:t>22-05-2023</a:t>
             </a:fld>
             <a:endParaRPr lang="en-IN"/>
           </a:p>
@@ -1382,6 +1387,7 @@
           <a:p>
             <a:fld id="{E7DEFBB0-DAA9-400D-8362-8BC3D45340DE}" type="slidenum">
               <a:rPr lang="en-IN" smtClean="0"/>
+              <a:pPr/>
               <a:t>‹#›</a:t>
             </a:fld>
             <a:endParaRPr lang="en-IN"/>
@@ -1422,7 +1428,7 @@
     </p:spTree>
     <p:extLst>
       <p:ext uri="{BB962C8B-B14F-4D97-AF65-F5344CB8AC3E}">
-        <p14:creationId xmlns:p14="http://schemas.microsoft.com/office/powerpoint/2010/main" val="971516025"/>
+        <p14:creationId xmlns:p14="http://schemas.microsoft.com/office/powerpoint/2010/main" xmlns="" val="971516025"/>
       </p:ext>
     </p:extLst>
   </p:cSld>
@@ -1679,7 +1685,8 @@
           <a:p>
             <a:fld id="{B79ABB67-168E-4905-8090-49366666A8FD}" type="datetimeFigureOut">
               <a:rPr lang="en-IN" smtClean="0"/>
-              <a:t>21-05-2023</a:t>
+              <a:pPr/>
+              <a:t>22-05-2023</a:t>
             </a:fld>
             <a:endParaRPr lang="en-IN"/>
           </a:p>
@@ -1721,6 +1728,7 @@
           <a:p>
             <a:fld id="{E7DEFBB0-DAA9-400D-8362-8BC3D45340DE}" type="slidenum">
               <a:rPr lang="en-IN" smtClean="0"/>
+              <a:pPr/>
               <a:t>‹#›</a:t>
             </a:fld>
             <a:endParaRPr lang="en-IN"/>
@@ -1829,7 +1837,7 @@
     </p:spTree>
     <p:extLst>
       <p:ext uri="{BB962C8B-B14F-4D97-AF65-F5344CB8AC3E}">
-        <p14:creationId xmlns:p14="http://schemas.microsoft.com/office/powerpoint/2010/main" val="2980522792"/>
+        <p14:creationId xmlns:p14="http://schemas.microsoft.com/office/powerpoint/2010/main" xmlns="" val="2980522792"/>
       </p:ext>
     </p:extLst>
   </p:cSld>
@@ -2026,7 +2034,8 @@
           <a:p>
             <a:fld id="{B79ABB67-168E-4905-8090-49366666A8FD}" type="datetimeFigureOut">
               <a:rPr lang="en-IN" smtClean="0"/>
-              <a:t>21-05-2023</a:t>
+              <a:pPr/>
+              <a:t>22-05-2023</a:t>
             </a:fld>
             <a:endParaRPr lang="en-IN"/>
           </a:p>
@@ -2068,6 +2077,7 @@
           <a:p>
             <a:fld id="{E7DEFBB0-DAA9-400D-8362-8BC3D45340DE}" type="slidenum">
               <a:rPr lang="en-IN" smtClean="0"/>
+              <a:pPr/>
               <a:t>‹#›</a:t>
             </a:fld>
             <a:endParaRPr lang="en-IN"/>
@@ -2077,7 +2087,7 @@
     </p:spTree>
     <p:extLst>
       <p:ext uri="{BB962C8B-B14F-4D97-AF65-F5344CB8AC3E}">
-        <p14:creationId xmlns:p14="http://schemas.microsoft.com/office/powerpoint/2010/main" val="255367862"/>
+        <p14:creationId xmlns:p14="http://schemas.microsoft.com/office/powerpoint/2010/main" xmlns="" val="255367862"/>
       </p:ext>
     </p:extLst>
   </p:cSld>
@@ -2400,7 +2410,8 @@
           <a:p>
             <a:fld id="{B79ABB67-168E-4905-8090-49366666A8FD}" type="datetimeFigureOut">
               <a:rPr lang="en-IN" smtClean="0"/>
-              <a:t>21-05-2023</a:t>
+              <a:pPr/>
+              <a:t>22-05-2023</a:t>
             </a:fld>
             <a:endParaRPr lang="en-IN"/>
           </a:p>
@@ -2442,6 +2453,7 @@
           <a:p>
             <a:fld id="{E7DEFBB0-DAA9-400D-8362-8BC3D45340DE}" type="slidenum">
               <a:rPr lang="en-IN" smtClean="0"/>
+              <a:pPr/>
               <a:t>‹#›</a:t>
             </a:fld>
             <a:endParaRPr lang="en-IN"/>
@@ -2550,7 +2562,7 @@
     </p:spTree>
     <p:extLst>
       <p:ext uri="{BB962C8B-B14F-4D97-AF65-F5344CB8AC3E}">
-        <p14:creationId xmlns:p14="http://schemas.microsoft.com/office/powerpoint/2010/main" val="1891282021"/>
+        <p14:creationId xmlns:p14="http://schemas.microsoft.com/office/powerpoint/2010/main" xmlns="" val="1891282021"/>
       </p:ext>
     </p:extLst>
   </p:cSld>
@@ -2870,7 +2882,8 @@
           <a:p>
             <a:fld id="{B79ABB67-168E-4905-8090-49366666A8FD}" type="datetimeFigureOut">
               <a:rPr lang="en-IN" smtClean="0"/>
-              <a:t>21-05-2023</a:t>
+              <a:pPr/>
+              <a:t>22-05-2023</a:t>
             </a:fld>
             <a:endParaRPr lang="en-IN"/>
           </a:p>
@@ -2912,6 +2925,7 @@
           <a:p>
             <a:fld id="{E7DEFBB0-DAA9-400D-8362-8BC3D45340DE}" type="slidenum">
               <a:rPr lang="en-IN" smtClean="0"/>
+              <a:pPr/>
               <a:t>‹#›</a:t>
             </a:fld>
             <a:endParaRPr lang="en-IN"/>
@@ -2952,7 +2966,7 @@
     </p:spTree>
     <p:extLst>
       <p:ext uri="{BB962C8B-B14F-4D97-AF65-F5344CB8AC3E}">
-        <p14:creationId xmlns:p14="http://schemas.microsoft.com/office/powerpoint/2010/main" val="3953613644"/>
+        <p14:creationId xmlns:p14="http://schemas.microsoft.com/office/powerpoint/2010/main" xmlns="" val="3953613644"/>
       </p:ext>
     </p:extLst>
   </p:cSld>
@@ -3075,7 +3089,8 @@
           <a:p>
             <a:fld id="{B79ABB67-168E-4905-8090-49366666A8FD}" type="datetimeFigureOut">
               <a:rPr lang="en-IN" smtClean="0"/>
-              <a:t>21-05-2023</a:t>
+              <a:pPr/>
+              <a:t>22-05-2023</a:t>
             </a:fld>
             <a:endParaRPr lang="en-IN"/>
           </a:p>
@@ -3117,6 +3132,7 @@
           <a:p>
             <a:fld id="{E7DEFBB0-DAA9-400D-8362-8BC3D45340DE}" type="slidenum">
               <a:rPr lang="en-IN" smtClean="0"/>
+              <a:pPr/>
               <a:t>‹#›</a:t>
             </a:fld>
             <a:endParaRPr lang="en-IN"/>
@@ -3157,7 +3173,7 @@
     </p:spTree>
     <p:extLst>
       <p:ext uri="{BB962C8B-B14F-4D97-AF65-F5344CB8AC3E}">
-        <p14:creationId xmlns:p14="http://schemas.microsoft.com/office/powerpoint/2010/main" val="801249338"/>
+        <p14:creationId xmlns:p14="http://schemas.microsoft.com/office/powerpoint/2010/main" xmlns="" val="801249338"/>
       </p:ext>
     </p:extLst>
   </p:cSld>
@@ -3286,7 +3302,8 @@
           <a:p>
             <a:fld id="{B79ABB67-168E-4905-8090-49366666A8FD}" type="datetimeFigureOut">
               <a:rPr lang="en-IN" smtClean="0"/>
-              <a:t>21-05-2023</a:t>
+              <a:pPr/>
+              <a:t>22-05-2023</a:t>
             </a:fld>
             <a:endParaRPr lang="en-IN"/>
           </a:p>
@@ -3328,6 +3345,7 @@
           <a:p>
             <a:fld id="{E7DEFBB0-DAA9-400D-8362-8BC3D45340DE}" type="slidenum">
               <a:rPr lang="en-IN" smtClean="0"/>
+              <a:pPr/>
               <a:t>‹#›</a:t>
             </a:fld>
             <a:endParaRPr lang="en-IN"/>
@@ -3368,7 +3386,7 @@
     </p:spTree>
     <p:extLst>
       <p:ext uri="{BB962C8B-B14F-4D97-AF65-F5344CB8AC3E}">
-        <p14:creationId xmlns:p14="http://schemas.microsoft.com/office/powerpoint/2010/main" val="2826573483"/>
+        <p14:creationId xmlns:p14="http://schemas.microsoft.com/office/powerpoint/2010/main" xmlns="" val="2826573483"/>
       </p:ext>
     </p:extLst>
   </p:cSld>
@@ -3518,7 +3536,8 @@
           <a:p>
             <a:fld id="{B79ABB67-168E-4905-8090-49366666A8FD}" type="datetimeFigureOut">
               <a:rPr lang="en-IN" smtClean="0"/>
-              <a:t>21-05-2023</a:t>
+              <a:pPr/>
+              <a:t>22-05-2023</a:t>
             </a:fld>
             <a:endParaRPr lang="en-IN"/>
           </a:p>
@@ -3560,6 +3579,7 @@
           <a:p>
             <a:fld id="{E7DEFBB0-DAA9-400D-8362-8BC3D45340DE}" type="slidenum">
               <a:rPr lang="en-IN" smtClean="0"/>
+              <a:pPr/>
               <a:t>‹#›</a:t>
             </a:fld>
             <a:endParaRPr lang="en-IN"/>
@@ -3569,7 +3589,7 @@
     </p:spTree>
     <p:extLst>
       <p:ext uri="{BB962C8B-B14F-4D97-AF65-F5344CB8AC3E}">
-        <p14:creationId xmlns:p14="http://schemas.microsoft.com/office/powerpoint/2010/main" val="3006024522"/>
+        <p14:creationId xmlns:p14="http://schemas.microsoft.com/office/powerpoint/2010/main" xmlns="" val="3006024522"/>
       </p:ext>
     </p:extLst>
   </p:cSld>
@@ -3766,7 +3786,8 @@
           <a:p>
             <a:fld id="{B79ABB67-168E-4905-8090-49366666A8FD}" type="datetimeFigureOut">
               <a:rPr lang="en-IN" smtClean="0"/>
-              <a:t>21-05-2023</a:t>
+              <a:pPr/>
+              <a:t>22-05-2023</a:t>
             </a:fld>
             <a:endParaRPr lang="en-IN"/>
           </a:p>
@@ -3808,6 +3829,7 @@
           <a:p>
             <a:fld id="{E7DEFBB0-DAA9-400D-8362-8BC3D45340DE}" type="slidenum">
               <a:rPr lang="en-IN" smtClean="0"/>
+              <a:pPr/>
               <a:t>‹#›</a:t>
             </a:fld>
             <a:endParaRPr lang="en-IN"/>
@@ -3848,7 +3870,7 @@
     </p:spTree>
     <p:extLst>
       <p:ext uri="{BB962C8B-B14F-4D97-AF65-F5344CB8AC3E}">
-        <p14:creationId xmlns:p14="http://schemas.microsoft.com/office/powerpoint/2010/main" val="2723057677"/>
+        <p14:creationId xmlns:p14="http://schemas.microsoft.com/office/powerpoint/2010/main" xmlns="" val="2723057677"/>
       </p:ext>
     </p:extLst>
   </p:cSld>
@@ -4064,7 +4086,8 @@
           <a:p>
             <a:fld id="{B79ABB67-168E-4905-8090-49366666A8FD}" type="datetimeFigureOut">
               <a:rPr lang="en-IN" smtClean="0"/>
-              <a:t>21-05-2023</a:t>
+              <a:pPr/>
+              <a:t>22-05-2023</a:t>
             </a:fld>
             <a:endParaRPr lang="en-IN"/>
           </a:p>
@@ -4106,6 +4129,7 @@
           <a:p>
             <a:fld id="{E7DEFBB0-DAA9-400D-8362-8BC3D45340DE}" type="slidenum">
               <a:rPr lang="en-IN" smtClean="0"/>
+              <a:pPr/>
               <a:t>‹#›</a:t>
             </a:fld>
             <a:endParaRPr lang="en-IN"/>
@@ -4115,7 +4139,7 @@
     </p:spTree>
     <p:extLst>
       <p:ext uri="{BB962C8B-B14F-4D97-AF65-F5344CB8AC3E}">
-        <p14:creationId xmlns:p14="http://schemas.microsoft.com/office/powerpoint/2010/main" val="2784263896"/>
+        <p14:creationId xmlns:p14="http://schemas.microsoft.com/office/powerpoint/2010/main" xmlns="" val="2784263896"/>
       </p:ext>
     </p:extLst>
   </p:cSld>
@@ -4458,7 +4482,8 @@
           <a:p>
             <a:fld id="{B79ABB67-168E-4905-8090-49366666A8FD}" type="datetimeFigureOut">
               <a:rPr lang="en-IN" smtClean="0"/>
-              <a:t>21-05-2023</a:t>
+              <a:pPr/>
+              <a:t>22-05-2023</a:t>
             </a:fld>
             <a:endParaRPr lang="en-IN"/>
           </a:p>
@@ -4500,6 +4525,7 @@
           <a:p>
             <a:fld id="{E7DEFBB0-DAA9-400D-8362-8BC3D45340DE}" type="slidenum">
               <a:rPr lang="en-IN" smtClean="0"/>
+              <a:pPr/>
               <a:t>‹#›</a:t>
             </a:fld>
             <a:endParaRPr lang="en-IN"/>
@@ -4540,7 +4566,7 @@
     </p:spTree>
     <p:extLst>
       <p:ext uri="{BB962C8B-B14F-4D97-AF65-F5344CB8AC3E}">
-        <p14:creationId xmlns:p14="http://schemas.microsoft.com/office/powerpoint/2010/main" val="3322609401"/>
+        <p14:creationId xmlns:p14="http://schemas.microsoft.com/office/powerpoint/2010/main" xmlns="" val="3322609401"/>
       </p:ext>
     </p:extLst>
   </p:cSld>
@@ -4607,7 +4633,8 @@
           <a:p>
             <a:fld id="{B79ABB67-168E-4905-8090-49366666A8FD}" type="datetimeFigureOut">
               <a:rPr lang="en-IN" smtClean="0"/>
-              <a:t>21-05-2023</a:t>
+              <a:pPr/>
+              <a:t>22-05-2023</a:t>
             </a:fld>
             <a:endParaRPr lang="en-IN"/>
           </a:p>
@@ -4649,6 +4676,7 @@
           <a:p>
             <a:fld id="{E7DEFBB0-DAA9-400D-8362-8BC3D45340DE}" type="slidenum">
               <a:rPr lang="en-IN" smtClean="0"/>
+              <a:pPr/>
               <a:t>‹#›</a:t>
             </a:fld>
             <a:endParaRPr lang="en-IN"/>
@@ -4689,7 +4717,7 @@
     </p:spTree>
     <p:extLst>
       <p:ext uri="{BB962C8B-B14F-4D97-AF65-F5344CB8AC3E}">
-        <p14:creationId xmlns:p14="http://schemas.microsoft.com/office/powerpoint/2010/main" val="4210979487"/>
+        <p14:creationId xmlns:p14="http://schemas.microsoft.com/office/powerpoint/2010/main" xmlns="" val="4210979487"/>
       </p:ext>
     </p:extLst>
   </p:cSld>
@@ -4733,7 +4761,8 @@
           <a:p>
             <a:fld id="{B79ABB67-168E-4905-8090-49366666A8FD}" type="datetimeFigureOut">
               <a:rPr lang="en-IN" smtClean="0"/>
-              <a:t>21-05-2023</a:t>
+              <a:pPr/>
+              <a:t>22-05-2023</a:t>
             </a:fld>
             <a:endParaRPr lang="en-IN"/>
           </a:p>
@@ -4775,6 +4804,7 @@
           <a:p>
             <a:fld id="{E7DEFBB0-DAA9-400D-8362-8BC3D45340DE}" type="slidenum">
               <a:rPr lang="en-IN" smtClean="0"/>
+              <a:pPr/>
               <a:t>‹#›</a:t>
             </a:fld>
             <a:endParaRPr lang="en-IN"/>
@@ -4784,7 +4814,7 @@
     </p:spTree>
     <p:extLst>
       <p:ext uri="{BB962C8B-B14F-4D97-AF65-F5344CB8AC3E}">
-        <p14:creationId xmlns:p14="http://schemas.microsoft.com/office/powerpoint/2010/main" val="442768054"/>
+        <p14:creationId xmlns:p14="http://schemas.microsoft.com/office/powerpoint/2010/main" xmlns="" val="442768054"/>
       </p:ext>
     </p:extLst>
   </p:cSld>
@@ -4988,7 +5018,8 @@
           <a:p>
             <a:fld id="{B79ABB67-168E-4905-8090-49366666A8FD}" type="datetimeFigureOut">
               <a:rPr lang="en-IN" smtClean="0"/>
-              <a:t>21-05-2023</a:t>
+              <a:pPr/>
+              <a:t>22-05-2023</a:t>
             </a:fld>
             <a:endParaRPr lang="en-IN"/>
           </a:p>
@@ -5030,6 +5061,7 @@
           <a:p>
             <a:fld id="{E7DEFBB0-DAA9-400D-8362-8BC3D45340DE}" type="slidenum">
               <a:rPr lang="en-IN" smtClean="0"/>
+              <a:pPr/>
               <a:t>‹#›</a:t>
             </a:fld>
             <a:endParaRPr lang="en-IN"/>
@@ -5070,7 +5102,7 @@
     </p:spTree>
     <p:extLst>
       <p:ext uri="{BB962C8B-B14F-4D97-AF65-F5344CB8AC3E}">
-        <p14:creationId xmlns:p14="http://schemas.microsoft.com/office/powerpoint/2010/main" val="496596134"/>
+        <p14:creationId xmlns:p14="http://schemas.microsoft.com/office/powerpoint/2010/main" xmlns="" val="496596134"/>
       </p:ext>
     </p:extLst>
   </p:cSld>
@@ -5303,7 +5335,8 @@
           <a:p>
             <a:fld id="{B79ABB67-168E-4905-8090-49366666A8FD}" type="datetimeFigureOut">
               <a:rPr lang="en-IN" smtClean="0"/>
-              <a:t>21-05-2023</a:t>
+              <a:pPr/>
+              <a:t>22-05-2023</a:t>
             </a:fld>
             <a:endParaRPr lang="en-IN"/>
           </a:p>
@@ -5345,6 +5378,7 @@
           <a:p>
             <a:fld id="{E7DEFBB0-DAA9-400D-8362-8BC3D45340DE}" type="slidenum">
               <a:rPr lang="en-IN" smtClean="0"/>
+              <a:pPr/>
               <a:t>‹#›</a:t>
             </a:fld>
             <a:endParaRPr lang="en-IN"/>
@@ -5354,7 +5388,7 @@
     </p:spTree>
     <p:extLst>
       <p:ext uri="{BB962C8B-B14F-4D97-AF65-F5344CB8AC3E}">
-        <p14:creationId xmlns:p14="http://schemas.microsoft.com/office/powerpoint/2010/main" val="3389449407"/>
+        <p14:creationId xmlns:p14="http://schemas.microsoft.com/office/powerpoint/2010/main" xmlns="" val="3389449407"/>
       </p:ext>
     </p:extLst>
   </p:cSld>
@@ -5412,7 +5446,7 @@
             <a:blip r:embed="rId19">
               <a:extLst>
                 <a:ext uri="{28A0092B-C50C-407E-A947-70E740481C1C}">
-                  <a14:useLocalDpi xmlns:a14="http://schemas.microsoft.com/office/drawing/2010/main" val="0"/>
+                  <a14:useLocalDpi xmlns:a14="http://schemas.microsoft.com/office/drawing/2010/main" xmlns="" val="0"/>
                 </a:ext>
               </a:extLst>
             </a:blip>
@@ -5476,7 +5510,7 @@
             <a:blip r:embed="rId20">
               <a:extLst>
                 <a:ext uri="{28A0092B-C50C-407E-A947-70E740481C1C}">
-                  <a14:useLocalDpi xmlns:a14="http://schemas.microsoft.com/office/drawing/2010/main" val="0"/>
+                  <a14:useLocalDpi xmlns:a14="http://schemas.microsoft.com/office/drawing/2010/main" xmlns="" val="0"/>
                 </a:ext>
               </a:extLst>
             </a:blip>
@@ -5505,7 +5539,7 @@
             <a:blip r:embed="rId20">
               <a:extLst>
                 <a:ext uri="{28A0092B-C50C-407E-A947-70E740481C1C}">
-                  <a14:useLocalDpi xmlns:a14="http://schemas.microsoft.com/office/drawing/2010/main" val="0"/>
+                  <a14:useLocalDpi xmlns:a14="http://schemas.microsoft.com/office/drawing/2010/main" xmlns="" val="0"/>
                 </a:ext>
               </a:extLst>
             </a:blip>
@@ -5654,7 +5688,8 @@
           <a:p>
             <a:fld id="{B79ABB67-168E-4905-8090-49366666A8FD}" type="datetimeFigureOut">
               <a:rPr lang="en-IN" smtClean="0"/>
-              <a:t>21-05-2023</a:t>
+              <a:pPr/>
+              <a:t>22-05-2023</a:t>
             </a:fld>
             <a:endParaRPr lang="en-IN"/>
           </a:p>
@@ -5732,6 +5767,7 @@
           <a:p>
             <a:fld id="{E7DEFBB0-DAA9-400D-8362-8BC3D45340DE}" type="slidenum">
               <a:rPr lang="en-IN" smtClean="0"/>
+              <a:pPr/>
               <a:t>‹#›</a:t>
             </a:fld>
             <a:endParaRPr lang="en-IN"/>
@@ -5741,7 +5777,7 @@
     </p:spTree>
     <p:extLst>
       <p:ext uri="{BB962C8B-B14F-4D97-AF65-F5344CB8AC3E}">
-        <p14:creationId xmlns:p14="http://schemas.microsoft.com/office/powerpoint/2010/main" val="2220028945"/>
+        <p14:creationId xmlns:p14="http://schemas.microsoft.com/office/powerpoint/2010/main" xmlns="" val="2220028945"/>
       </p:ext>
     </p:extLst>
   </p:cSld>
@@ -6202,7 +6238,7 @@
           <p:cNvPr id="2" name="Title 1">
             <a:extLst>
               <a:ext uri="{FF2B5EF4-FFF2-40B4-BE49-F238E27FC236}">
-                <a16:creationId xmlns:a16="http://schemas.microsoft.com/office/drawing/2014/main" id="{F1285650-C0F7-EA6B-AACA-9981DC4F427C}"/>
+                <a16:creationId xmlns:a16="http://schemas.microsoft.com/office/drawing/2014/main" xmlns="" id="{F1285650-C0F7-EA6B-AACA-9981DC4F427C}"/>
               </a:ext>
             </a:extLst>
           </p:cNvPr>
@@ -6239,7 +6275,7 @@
           <p:cNvPr id="3" name="Subtitle 2">
             <a:extLst>
               <a:ext uri="{FF2B5EF4-FFF2-40B4-BE49-F238E27FC236}">
-                <a16:creationId xmlns:a16="http://schemas.microsoft.com/office/drawing/2014/main" id="{C440133A-1D16-A506-D514-0DD055432130}"/>
+                <a16:creationId xmlns:a16="http://schemas.microsoft.com/office/drawing/2014/main" xmlns="" id="{C440133A-1D16-A506-D514-0DD055432130}"/>
               </a:ext>
             </a:extLst>
           </p:cNvPr>
@@ -6288,13 +6324,20 @@
     </p:spTree>
     <p:extLst>
       <p:ext uri="{BB962C8B-B14F-4D97-AF65-F5344CB8AC3E}">
-        <p14:creationId xmlns:p14="http://schemas.microsoft.com/office/powerpoint/2010/main" val="1947532594"/>
+        <p14:creationId xmlns:p14="http://schemas.microsoft.com/office/powerpoint/2010/main" xmlns="" val="1947532594"/>
       </p:ext>
     </p:extLst>
   </p:cSld>
   <p:clrMapOvr>
     <a:masterClrMapping/>
   </p:clrMapOvr>
+  <p:timing>
+    <p:tnLst>
+      <p:par>
+        <p:cTn id="1" dur="indefinite" restart="never" nodeType="tmRoot"/>
+      </p:par>
+    </p:tnLst>
+  </p:timing>
 </p:sld>
 </file>
 
@@ -6320,7 +6363,7 @@
           <p:cNvPr id="2" name="Title 1">
             <a:extLst>
               <a:ext uri="{FF2B5EF4-FFF2-40B4-BE49-F238E27FC236}">
-                <a16:creationId xmlns:a16="http://schemas.microsoft.com/office/drawing/2014/main" id="{0080C9A7-438F-CC9C-4A11-B702B55A3D62}"/>
+                <a16:creationId xmlns:a16="http://schemas.microsoft.com/office/drawing/2014/main" xmlns="" id="{7C0B7ADC-ADAA-4C95-9EC2-2D123477BD64}"/>
               </a:ext>
             </a:extLst>
           </p:cNvPr>
@@ -6331,50 +6374,66 @@
             <p:ph type="title"/>
           </p:nvPr>
         </p:nvSpPr>
-        <p:spPr/>
-        <p:txBody>
-          <a:bodyPr/>
-          <a:lstStyle/>
-          <a:p>
-            <a:endParaRPr lang="en-IN"/>
-          </a:p>
-        </p:txBody>
-      </p:sp>
-      <p:sp>
-        <p:nvSpPr>
-          <p:cNvPr id="3" name="Content Placeholder 2">
-            <a:extLst>
-              <a:ext uri="{FF2B5EF4-FFF2-40B4-BE49-F238E27FC236}">
-                <a16:creationId xmlns:a16="http://schemas.microsoft.com/office/drawing/2014/main" id="{4080F731-0353-1041-536C-12ED71E92C90}"/>
-              </a:ext>
-            </a:extLst>
-          </p:cNvPr>
-          <p:cNvSpPr>
-            <a:spLocks noGrp="1"/>
-          </p:cNvSpPr>
+        <p:spPr>
+          <a:xfrm>
+            <a:off x="1225064" y="391289"/>
+            <a:ext cx="9601196" cy="1303867"/>
+          </a:xfrm>
+        </p:spPr>
+        <p:txBody>
+          <a:bodyPr>
+            <a:normAutofit/>
+          </a:bodyPr>
+          <a:lstStyle/>
+          <a:p>
+            <a:r>
+              <a:rPr lang="en-IN" sz="3600" b="1" dirty="0" smtClean="0"/>
+              <a:t>How To Use Checkout And Log Command</a:t>
+            </a:r>
+            <a:endParaRPr lang="en-IN" sz="3600" b="1" dirty="0"/>
+          </a:p>
+        </p:txBody>
+      </p:sp>
+      <p:pic>
+        <p:nvPicPr>
+          <p:cNvPr id="4" name="Content Placeholder 3" descr="Screenshot (5).png"/>
+          <p:cNvPicPr>
+            <a:picLocks noGrp="1" noChangeAspect="1"/>
+          </p:cNvPicPr>
           <p:nvPr>
             <p:ph idx="1"/>
           </p:nvPr>
-        </p:nvSpPr>
-        <p:spPr/>
-        <p:txBody>
-          <a:bodyPr/>
-          <a:lstStyle/>
-          <a:p>
-            <a:endParaRPr lang="en-IN"/>
-          </a:p>
-        </p:txBody>
-      </p:sp>
+        </p:nvPicPr>
+        <p:blipFill>
+          <a:blip r:embed="rId2"/>
+          <a:stretch>
+            <a:fillRect/>
+          </a:stretch>
+        </p:blipFill>
+        <p:spPr>
+          <a:xfrm>
+            <a:off x="886265" y="1505243"/>
+            <a:ext cx="10241280" cy="4642340"/>
+          </a:xfrm>
+        </p:spPr>
+      </p:pic>
     </p:spTree>
     <p:extLst>
       <p:ext uri="{BB962C8B-B14F-4D97-AF65-F5344CB8AC3E}">
-        <p14:creationId xmlns:p14="http://schemas.microsoft.com/office/powerpoint/2010/main" val="623399994"/>
+        <p14:creationId xmlns:p14="http://schemas.microsoft.com/office/powerpoint/2010/main" xmlns="" val="2892361523"/>
       </p:ext>
     </p:extLst>
   </p:cSld>
   <p:clrMapOvr>
     <a:masterClrMapping/>
   </p:clrMapOvr>
+  <p:timing>
+    <p:tnLst>
+      <p:par>
+        <p:cTn id="1" dur="indefinite" restart="never" nodeType="tmRoot"/>
+      </p:par>
+    </p:tnLst>
+  </p:timing>
 </p:sld>
 </file>
 
@@ -6400,7 +6459,7 @@
           <p:cNvPr id="2" name="Title 1">
             <a:extLst>
               <a:ext uri="{FF2B5EF4-FFF2-40B4-BE49-F238E27FC236}">
-                <a16:creationId xmlns:a16="http://schemas.microsoft.com/office/drawing/2014/main" id="{D78623BE-A005-89AF-E9A8-7C70EAEB1CC8}"/>
+                <a16:creationId xmlns:a16="http://schemas.microsoft.com/office/drawing/2014/main" xmlns="" id="{7C554504-91FF-63AA-4C6D-54BD40E3BED0}"/>
               </a:ext>
             </a:extLst>
           </p:cNvPr>
@@ -6413,48 +6472,71 @@
         </p:nvSpPr>
         <p:spPr/>
         <p:txBody>
-          <a:bodyPr/>
-          <a:lstStyle/>
-          <a:p>
-            <a:endParaRPr lang="en-IN"/>
-          </a:p>
-        </p:txBody>
-      </p:sp>
-      <p:sp>
-        <p:nvSpPr>
-          <p:cNvPr id="3" name="Content Placeholder 2">
-            <a:extLst>
-              <a:ext uri="{FF2B5EF4-FFF2-40B4-BE49-F238E27FC236}">
-                <a16:creationId xmlns:a16="http://schemas.microsoft.com/office/drawing/2014/main" id="{275E1334-11FB-6F96-5175-AA02B643402A}"/>
-              </a:ext>
-            </a:extLst>
-          </p:cNvPr>
-          <p:cNvSpPr>
-            <a:spLocks noGrp="1"/>
-          </p:cNvSpPr>
+          <a:bodyPr>
+            <a:normAutofit fontScale="90000"/>
+          </a:bodyPr>
+          <a:lstStyle/>
+          <a:p>
+            <a:r>
+              <a:rPr lang="en-IN" sz="4900" b="1" dirty="0" smtClean="0"/>
+              <a:t>Thank You </a:t>
+            </a:r>
+            <a:r>
+              <a:rPr lang="en-IN" b="1" dirty="0" smtClean="0"/>
+              <a:t/>
+            </a:r>
+            <a:br>
+              <a:rPr lang="en-IN" b="1" dirty="0" smtClean="0"/>
+            </a:br>
+            <a:r>
+              <a:rPr lang="en-IN" b="1" dirty="0" smtClean="0"/>
+              <a:t>NIIT UNIVERSITY</a:t>
+            </a:r>
+            <a:endParaRPr lang="en-IN" b="1" dirty="0"/>
+          </a:p>
+        </p:txBody>
+      </p:sp>
+      <p:pic>
+        <p:nvPicPr>
+          <p:cNvPr id="4" name="Content Placeholder 3" descr="WhatsApp Image 2023-05-22 at 07.48.19.jpeg"/>
+          <p:cNvPicPr>
+            <a:picLocks noGrp="1" noChangeAspect="1"/>
+          </p:cNvPicPr>
           <p:nvPr>
             <p:ph idx="1"/>
           </p:nvPr>
-        </p:nvSpPr>
-        <p:spPr/>
-        <p:txBody>
-          <a:bodyPr/>
-          <a:lstStyle/>
-          <a:p>
-            <a:endParaRPr lang="en-IN"/>
-          </a:p>
-        </p:txBody>
-      </p:sp>
+        </p:nvPicPr>
+        <p:blipFill>
+          <a:blip r:embed="rId2"/>
+          <a:srcRect l="16283" t="21286" r="30669" b="22322"/>
+          <a:stretch>
+            <a:fillRect/>
+          </a:stretch>
+        </p:blipFill>
+        <p:spPr>
+          <a:xfrm>
+            <a:off x="1237958" y="2504049"/>
+            <a:ext cx="9833316" cy="3530991"/>
+          </a:xfrm>
+        </p:spPr>
+      </p:pic>
     </p:spTree>
     <p:extLst>
       <p:ext uri="{BB962C8B-B14F-4D97-AF65-F5344CB8AC3E}">
-        <p14:creationId xmlns:p14="http://schemas.microsoft.com/office/powerpoint/2010/main" val="3047941849"/>
+        <p14:creationId xmlns:p14="http://schemas.microsoft.com/office/powerpoint/2010/main" xmlns="" val="3939918763"/>
       </p:ext>
     </p:extLst>
   </p:cSld>
   <p:clrMapOvr>
     <a:masterClrMapping/>
   </p:clrMapOvr>
+  <p:timing>
+    <p:tnLst>
+      <p:par>
+        <p:cTn id="1" dur="indefinite" restart="never" nodeType="tmRoot"/>
+      </p:par>
+    </p:tnLst>
+  </p:timing>
 </p:sld>
 </file>
 
@@ -6480,7 +6562,7 @@
           <p:cNvPr id="2" name="Title 1">
             <a:extLst>
               <a:ext uri="{FF2B5EF4-FFF2-40B4-BE49-F238E27FC236}">
-                <a16:creationId xmlns:a16="http://schemas.microsoft.com/office/drawing/2014/main" id="{AAB53573-6DAA-3B57-D4A2-8E6157B73845}"/>
+                <a16:creationId xmlns:a16="http://schemas.microsoft.com/office/drawing/2014/main" xmlns="" id="{AAB53573-6DAA-3B57-D4A2-8E6157B73845}"/>
               </a:ext>
             </a:extLst>
           </p:cNvPr>
@@ -6513,7 +6595,7 @@
           <p:cNvPr id="3" name="Content Placeholder 2">
             <a:extLst>
               <a:ext uri="{FF2B5EF4-FFF2-40B4-BE49-F238E27FC236}">
-                <a16:creationId xmlns:a16="http://schemas.microsoft.com/office/drawing/2014/main" id="{706DDD91-D1D0-9BD5-D5AB-71A0DB4E5F33}"/>
+                <a16:creationId xmlns:a16="http://schemas.microsoft.com/office/drawing/2014/main" xmlns="" id="{706DDD91-D1D0-9BD5-D5AB-71A0DB4E5F33}"/>
               </a:ext>
             </a:extLst>
           </p:cNvPr>
@@ -6552,7 +6634,7 @@
           <p:cNvPr id="5" name="Picture 4">
             <a:extLst>
               <a:ext uri="{FF2B5EF4-FFF2-40B4-BE49-F238E27FC236}">
-                <a16:creationId xmlns:a16="http://schemas.microsoft.com/office/drawing/2014/main" id="{7BE041F6-0472-CE31-DE9F-9E0E8A7645CA}"/>
+                <a16:creationId xmlns:a16="http://schemas.microsoft.com/office/drawing/2014/main" xmlns="" id="{7BE041F6-0472-CE31-DE9F-9E0E8A7645CA}"/>
               </a:ext>
             </a:extLst>
           </p:cNvPr>
@@ -6565,7 +6647,7 @@
           <a:blip r:embed="rId2">
             <a:extLst>
               <a:ext uri="{28A0092B-C50C-407E-A947-70E740481C1C}">
-                <a14:useLocalDpi xmlns:a14="http://schemas.microsoft.com/office/drawing/2010/main" val="0"/>
+                <a14:useLocalDpi xmlns:a14="http://schemas.microsoft.com/office/drawing/2010/main" xmlns="" val="0"/>
               </a:ext>
             </a:extLst>
           </a:blip>
@@ -6585,13 +6667,20 @@
     </p:spTree>
     <p:extLst>
       <p:ext uri="{BB962C8B-B14F-4D97-AF65-F5344CB8AC3E}">
-        <p14:creationId xmlns:p14="http://schemas.microsoft.com/office/powerpoint/2010/main" val="2496773806"/>
+        <p14:creationId xmlns:p14="http://schemas.microsoft.com/office/powerpoint/2010/main" xmlns="" val="2496773806"/>
       </p:ext>
     </p:extLst>
   </p:cSld>
   <p:clrMapOvr>
     <a:masterClrMapping/>
   </p:clrMapOvr>
+  <p:timing>
+    <p:tnLst>
+      <p:par>
+        <p:cTn id="1" dur="indefinite" restart="never" nodeType="tmRoot"/>
+      </p:par>
+    </p:tnLst>
+  </p:timing>
 </p:sld>
 </file>
 
@@ -6617,7 +6706,7 @@
           <p:cNvPr id="2" name="Title 1">
             <a:extLst>
               <a:ext uri="{FF2B5EF4-FFF2-40B4-BE49-F238E27FC236}">
-                <a16:creationId xmlns:a16="http://schemas.microsoft.com/office/drawing/2014/main" id="{8E264C81-0323-AD6B-722A-DC9B5CD0DD8A}"/>
+                <a16:creationId xmlns:a16="http://schemas.microsoft.com/office/drawing/2014/main" xmlns="" id="{8E264C81-0323-AD6B-722A-DC9B5CD0DD8A}"/>
               </a:ext>
             </a:extLst>
           </p:cNvPr>
@@ -6628,50 +6717,65 @@
             <p:ph type="title"/>
           </p:nvPr>
         </p:nvSpPr>
-        <p:spPr/>
+        <p:spPr>
+          <a:xfrm>
+            <a:off x="1323538" y="630440"/>
+            <a:ext cx="9601196" cy="1303867"/>
+          </a:xfrm>
+        </p:spPr>
         <p:txBody>
           <a:bodyPr/>
           <a:lstStyle/>
           <a:p>
+            <a:r>
+              <a:rPr lang="en-IN" dirty="0" smtClean="0"/>
+              <a:t>Exchanging Of Codes</a:t>
+            </a:r>
             <a:endParaRPr lang="en-IN" dirty="0"/>
           </a:p>
         </p:txBody>
       </p:sp>
-      <p:sp>
-        <p:nvSpPr>
-          <p:cNvPr id="3" name="Content Placeholder 2">
-            <a:extLst>
-              <a:ext uri="{FF2B5EF4-FFF2-40B4-BE49-F238E27FC236}">
-                <a16:creationId xmlns:a16="http://schemas.microsoft.com/office/drawing/2014/main" id="{94688428-DED2-25F6-CDB0-75E18D9329A4}"/>
-              </a:ext>
-            </a:extLst>
-          </p:cNvPr>
-          <p:cNvSpPr>
-            <a:spLocks noGrp="1"/>
-          </p:cNvSpPr>
+      <p:pic>
+        <p:nvPicPr>
+          <p:cNvPr id="4" name="Content Placeholder 3" descr="WhatsApp Image 2023-05-21 at 15.21.45.jpeg"/>
+          <p:cNvPicPr>
+            <a:picLocks noGrp="1" noChangeAspect="1"/>
+          </p:cNvPicPr>
           <p:nvPr>
             <p:ph idx="1"/>
           </p:nvPr>
-        </p:nvSpPr>
-        <p:spPr/>
-        <p:txBody>
-          <a:bodyPr/>
-          <a:lstStyle/>
-          <a:p>
-            <a:endParaRPr lang="en-IN"/>
-          </a:p>
-        </p:txBody>
-      </p:sp>
+        </p:nvPicPr>
+        <p:blipFill>
+          <a:blip r:embed="rId2"/>
+          <a:srcRect l="4362" t="10046" r="18791" b="16115"/>
+          <a:stretch>
+            <a:fillRect/>
+          </a:stretch>
+        </p:blipFill>
+        <p:spPr>
+          <a:xfrm>
+            <a:off x="534571" y="1617785"/>
+            <a:ext cx="11141613" cy="4698609"/>
+          </a:xfrm>
+        </p:spPr>
+      </p:pic>
     </p:spTree>
     <p:extLst>
       <p:ext uri="{BB962C8B-B14F-4D97-AF65-F5344CB8AC3E}">
-        <p14:creationId xmlns:p14="http://schemas.microsoft.com/office/powerpoint/2010/main" val="895802936"/>
+        <p14:creationId xmlns:p14="http://schemas.microsoft.com/office/powerpoint/2010/main" xmlns="" val="895802936"/>
       </p:ext>
     </p:extLst>
   </p:cSld>
   <p:clrMapOvr>
     <a:masterClrMapping/>
   </p:clrMapOvr>
+  <p:timing>
+    <p:tnLst>
+      <p:par>
+        <p:cTn id="1" dur="indefinite" restart="never" nodeType="tmRoot"/>
+      </p:par>
+    </p:tnLst>
+  </p:timing>
 </p:sld>
 </file>
 
@@ -6694,13 +6798,7 @@
       </p:grpSpPr>
       <p:sp>
         <p:nvSpPr>
-          <p:cNvPr id="2" name="Title 1">
-            <a:extLst>
-              <a:ext uri="{FF2B5EF4-FFF2-40B4-BE49-F238E27FC236}">
-                <a16:creationId xmlns:a16="http://schemas.microsoft.com/office/drawing/2014/main" id="{521D9A83-F614-B6F7-9348-303ED48B60A9}"/>
-              </a:ext>
-            </a:extLst>
-          </p:cNvPr>
+          <p:cNvPr id="2" name="Title 1"/>
           <p:cNvSpPr>
             <a:spLocks noGrp="1"/>
           </p:cNvSpPr>
@@ -6713,45 +6811,46 @@
           <a:bodyPr/>
           <a:lstStyle/>
           <a:p>
-            <a:endParaRPr lang="en-IN"/>
-          </a:p>
-        </p:txBody>
-      </p:sp>
-      <p:sp>
-        <p:nvSpPr>
-          <p:cNvPr id="3" name="Content Placeholder 2">
-            <a:extLst>
-              <a:ext uri="{FF2B5EF4-FFF2-40B4-BE49-F238E27FC236}">
-                <a16:creationId xmlns:a16="http://schemas.microsoft.com/office/drawing/2014/main" id="{BE95639E-7018-12D3-79CB-83CB53763EFB}"/>
-              </a:ext>
-            </a:extLst>
-          </p:cNvPr>
-          <p:cNvSpPr>
-            <a:spLocks noGrp="1"/>
-          </p:cNvSpPr>
+            <a:endParaRPr lang="en-US"/>
+          </a:p>
+        </p:txBody>
+      </p:sp>
+      <p:pic>
+        <p:nvPicPr>
+          <p:cNvPr id="6" name="Content Placeholder 5" descr="Screenshot (27).png"/>
+          <p:cNvPicPr>
+            <a:picLocks noGrp="1" noChangeAspect="1"/>
+          </p:cNvPicPr>
           <p:nvPr>
             <p:ph idx="1"/>
           </p:nvPr>
-        </p:nvSpPr>
-        <p:spPr/>
-        <p:txBody>
-          <a:bodyPr/>
-          <a:lstStyle/>
-          <a:p>
-            <a:endParaRPr lang="en-IN"/>
-          </a:p>
-        </p:txBody>
-      </p:sp>
+        </p:nvPicPr>
+        <p:blipFill>
+          <a:blip r:embed="rId2"/>
+          <a:srcRect l="4339" t="8914" r="17480" b="12644"/>
+          <a:stretch>
+            <a:fillRect/>
+          </a:stretch>
+        </p:blipFill>
+        <p:spPr>
+          <a:xfrm>
+            <a:off x="689317" y="703386"/>
+            <a:ext cx="10750186" cy="5331654"/>
+          </a:xfrm>
+        </p:spPr>
+      </p:pic>
     </p:spTree>
-    <p:extLst>
-      <p:ext uri="{BB962C8B-B14F-4D97-AF65-F5344CB8AC3E}">
-        <p14:creationId xmlns:p14="http://schemas.microsoft.com/office/powerpoint/2010/main" val="3183434086"/>
-      </p:ext>
-    </p:extLst>
   </p:cSld>
   <p:clrMapOvr>
     <a:masterClrMapping/>
   </p:clrMapOvr>
+  <p:timing>
+    <p:tnLst>
+      <p:par>
+        <p:cTn id="1" dur="indefinite" restart="never" nodeType="tmRoot"/>
+      </p:par>
+    </p:tnLst>
+  </p:timing>
 </p:sld>
 </file>
 
@@ -6777,7 +6876,7 @@
           <p:cNvPr id="2" name="Title 1">
             <a:extLst>
               <a:ext uri="{FF2B5EF4-FFF2-40B4-BE49-F238E27FC236}">
-                <a16:creationId xmlns:a16="http://schemas.microsoft.com/office/drawing/2014/main" id="{4049D156-CD3B-363D-7488-26F00729C083}"/>
+                <a16:creationId xmlns:a16="http://schemas.microsoft.com/office/drawing/2014/main" xmlns="" id="{521D9A83-F614-B6F7-9348-303ED48B60A9}"/>
               </a:ext>
             </a:extLst>
           </p:cNvPr>
@@ -6788,12 +6887,21 @@
             <p:ph type="title"/>
           </p:nvPr>
         </p:nvSpPr>
-        <p:spPr/>
+        <p:spPr>
+          <a:xfrm>
+            <a:off x="1295402" y="897726"/>
+            <a:ext cx="9601196" cy="1303867"/>
+          </a:xfrm>
+        </p:spPr>
         <p:txBody>
           <a:bodyPr/>
           <a:lstStyle/>
           <a:p>
-            <a:endParaRPr lang="en-IN"/>
+            <a:r>
+              <a:rPr lang="en-IN" dirty="0" smtClean="0"/>
+              <a:t>Using Of Commands</a:t>
+            </a:r>
+            <a:endParaRPr lang="en-IN" dirty="0"/>
           </a:p>
         </p:txBody>
       </p:sp>
@@ -6802,7 +6910,7 @@
           <p:cNvPr id="3" name="Content Placeholder 2">
             <a:extLst>
               <a:ext uri="{FF2B5EF4-FFF2-40B4-BE49-F238E27FC236}">
-                <a16:creationId xmlns:a16="http://schemas.microsoft.com/office/drawing/2014/main" id="{6EF3F135-94EF-6576-23B5-8B4F0CEC1527}"/>
+                <a16:creationId xmlns:a16="http://schemas.microsoft.com/office/drawing/2014/main" xmlns="" id="{BE95639E-7018-12D3-79CB-83CB53763EFB}"/>
               </a:ext>
             </a:extLst>
           </p:cNvPr>
@@ -6813,25 +6921,73 @@
             <p:ph idx="1"/>
           </p:nvPr>
         </p:nvSpPr>
-        <p:spPr/>
+        <p:spPr>
+          <a:xfrm>
+            <a:off x="1351671" y="2472525"/>
+            <a:ext cx="9601196" cy="3318936"/>
+          </a:xfrm>
+        </p:spPr>
         <p:txBody>
           <a:bodyPr/>
           <a:lstStyle/>
           <a:p>
-            <a:endParaRPr lang="en-IN"/>
+            <a:r>
+              <a:rPr lang="en-IN" dirty="0" smtClean="0"/>
+              <a:t>Git clone – For Cloning The Repository in other machines</a:t>
+            </a:r>
+          </a:p>
+          <a:p>
+            <a:r>
+              <a:rPr lang="en-IN" dirty="0" smtClean="0"/>
+              <a:t>Git add . – For adding a file in local repository</a:t>
+            </a:r>
+          </a:p>
+          <a:p>
+            <a:r>
+              <a:rPr lang="en-IN" dirty="0" smtClean="0"/>
+              <a:t>Git commit – For committing the added file</a:t>
+            </a:r>
+          </a:p>
+          <a:p>
+            <a:r>
+              <a:rPr lang="en-IN" dirty="0" smtClean="0"/>
+              <a:t>Git push – For uploading the file from local repository to master repository </a:t>
+            </a:r>
+          </a:p>
+          <a:p>
+            <a:r>
+              <a:rPr lang="en-IN" dirty="0" smtClean="0"/>
+              <a:t>Git pull – For Extracting the files to the machines.</a:t>
+            </a:r>
+          </a:p>
+          <a:p>
+            <a:r>
+              <a:rPr lang="en-IN" dirty="0" smtClean="0"/>
+              <a:t>Git status – For viewing the status of files in repository</a:t>
+            </a:r>
+          </a:p>
+          <a:p>
+            <a:endParaRPr lang="en-IN" dirty="0"/>
           </a:p>
         </p:txBody>
       </p:sp>
     </p:spTree>
     <p:extLst>
       <p:ext uri="{BB962C8B-B14F-4D97-AF65-F5344CB8AC3E}">
-        <p14:creationId xmlns:p14="http://schemas.microsoft.com/office/powerpoint/2010/main" val="4192801060"/>
+        <p14:creationId xmlns:p14="http://schemas.microsoft.com/office/powerpoint/2010/main" xmlns="" val="3183434086"/>
       </p:ext>
     </p:extLst>
   </p:cSld>
   <p:clrMapOvr>
     <a:masterClrMapping/>
   </p:clrMapOvr>
+  <p:timing>
+    <p:tnLst>
+      <p:par>
+        <p:cTn id="1" dur="indefinite" restart="never" nodeType="tmRoot"/>
+      </p:par>
+    </p:tnLst>
+  </p:timing>
 </p:sld>
 </file>
 
@@ -6854,13 +7010,7 @@
       </p:grpSpPr>
       <p:sp>
         <p:nvSpPr>
-          <p:cNvPr id="2" name="Title 1">
-            <a:extLst>
-              <a:ext uri="{FF2B5EF4-FFF2-40B4-BE49-F238E27FC236}">
-                <a16:creationId xmlns:a16="http://schemas.microsoft.com/office/drawing/2014/main" id="{66CF5B8C-9BF0-14D4-CEEA-78EB0684B6AA}"/>
-              </a:ext>
-            </a:extLst>
-          </p:cNvPr>
+          <p:cNvPr id="2" name="Title 1"/>
           <p:cNvSpPr>
             <a:spLocks noGrp="1"/>
           </p:cNvSpPr>
@@ -6873,45 +7023,174 @@
           <a:bodyPr/>
           <a:lstStyle/>
           <a:p>
-            <a:endParaRPr lang="en-IN"/>
-          </a:p>
-        </p:txBody>
-      </p:sp>
-      <p:sp>
-        <p:nvSpPr>
-          <p:cNvPr id="3" name="Content Placeholder 2">
-            <a:extLst>
-              <a:ext uri="{FF2B5EF4-FFF2-40B4-BE49-F238E27FC236}">
-                <a16:creationId xmlns:a16="http://schemas.microsoft.com/office/drawing/2014/main" id="{EFFD672E-11EE-4285-8884-A3233A029B9C}"/>
-              </a:ext>
-            </a:extLst>
-          </p:cNvPr>
-          <p:cNvSpPr>
-            <a:spLocks noGrp="1"/>
-          </p:cNvSpPr>
-          <p:nvPr>
-            <p:ph idx="1"/>
+            <a:r>
+              <a:rPr lang="en-US" b="1" dirty="0" smtClean="0"/>
+              <a:t>Use Of </a:t>
+            </a:r>
+            <a:r>
+              <a:rPr lang="en-US" b="1" dirty="0" err="1" smtClean="0"/>
+              <a:t>Git</a:t>
+            </a:r>
+            <a:r>
+              <a:rPr lang="en-US" b="1" dirty="0" smtClean="0"/>
+              <a:t> Push And </a:t>
+            </a:r>
+            <a:r>
+              <a:rPr lang="en-US" b="1" dirty="0" err="1" smtClean="0"/>
+              <a:t>Git</a:t>
+            </a:r>
+            <a:r>
+              <a:rPr lang="en-US" b="1" dirty="0" smtClean="0"/>
+              <a:t> Pull</a:t>
+            </a:r>
+            <a:endParaRPr lang="en-US" b="1" dirty="0"/>
+          </a:p>
+        </p:txBody>
+      </p:sp>
+      <p:sp>
+        <p:nvSpPr>
+          <p:cNvPr id="3" name="Text Placeholder 2"/>
+          <p:cNvSpPr>
+            <a:spLocks noGrp="1"/>
+          </p:cNvSpPr>
+          <p:nvPr>
+            <p:ph type="body" idx="1"/>
+          </p:nvPr>
+        </p:nvSpPr>
+        <p:spPr>
+          <a:xfrm>
+            <a:off x="1295400" y="2461585"/>
+            <a:ext cx="4718304" cy="576262"/>
+          </a:xfrm>
+        </p:spPr>
+        <p:txBody>
+          <a:bodyPr/>
+          <a:lstStyle/>
+          <a:p>
+            <a:r>
+              <a:rPr lang="en-US" sz="3200" b="1" dirty="0" err="1" smtClean="0"/>
+              <a:t>Git</a:t>
+            </a:r>
+            <a:r>
+              <a:rPr lang="en-US" sz="3200" b="1" dirty="0" smtClean="0"/>
+              <a:t> Push</a:t>
+            </a:r>
+            <a:endParaRPr lang="en-US" sz="3200" b="1" dirty="0"/>
+          </a:p>
+        </p:txBody>
+      </p:sp>
+      <p:sp>
+        <p:nvSpPr>
+          <p:cNvPr id="4" name="Content Placeholder 3"/>
+          <p:cNvSpPr>
+            <a:spLocks noGrp="1"/>
+          </p:cNvSpPr>
+          <p:nvPr>
+            <p:ph sz="half" idx="2"/>
           </p:nvPr>
         </p:nvSpPr>
         <p:spPr/>
         <p:txBody>
+          <a:bodyPr>
+            <a:normAutofit/>
+          </a:bodyPr>
+          <a:lstStyle/>
+          <a:p>
+            <a:r>
+              <a:rPr lang="en-IN" sz="2800" dirty="0" smtClean="0"/>
+              <a:t> </a:t>
+            </a:r>
+            <a:r>
+              <a:rPr lang="en-IN" sz="3200" dirty="0" smtClean="0"/>
+              <a:t>For uploading the file from local repository to master </a:t>
+            </a:r>
+            <a:r>
+              <a:rPr lang="en-IN" sz="3200" dirty="0" smtClean="0"/>
+              <a:t>repository.</a:t>
+            </a:r>
+            <a:endParaRPr lang="en-IN" sz="2800" dirty="0" smtClean="0"/>
+          </a:p>
+          <a:p>
+            <a:pPr>
+              <a:buNone/>
+            </a:pPr>
+            <a:endParaRPr lang="en-US" sz="2800" dirty="0"/>
+          </a:p>
+        </p:txBody>
+      </p:sp>
+      <p:sp>
+        <p:nvSpPr>
+          <p:cNvPr id="5" name="Text Placeholder 4"/>
+          <p:cNvSpPr>
+            <a:spLocks noGrp="1"/>
+          </p:cNvSpPr>
+          <p:nvPr>
+            <p:ph type="body" sz="quarter" idx="3"/>
+          </p:nvPr>
+        </p:nvSpPr>
+        <p:spPr>
+          <a:xfrm>
+            <a:off x="6166603" y="2489720"/>
+            <a:ext cx="4718304" cy="576262"/>
+          </a:xfrm>
+        </p:spPr>
+        <p:txBody>
           <a:bodyPr/>
           <a:lstStyle/>
           <a:p>
-            <a:endParaRPr lang="en-IN"/>
+            <a:r>
+              <a:rPr lang="en-US" sz="3200" b="1" dirty="0" err="1" smtClean="0"/>
+              <a:t>Git</a:t>
+            </a:r>
+            <a:r>
+              <a:rPr lang="en-US" sz="3200" b="1" dirty="0" smtClean="0"/>
+              <a:t> Pull</a:t>
+            </a:r>
+            <a:endParaRPr lang="en-US" sz="3200" b="1" dirty="0"/>
+          </a:p>
+        </p:txBody>
+      </p:sp>
+      <p:sp>
+        <p:nvSpPr>
+          <p:cNvPr id="6" name="Content Placeholder 5"/>
+          <p:cNvSpPr>
+            <a:spLocks noGrp="1"/>
+          </p:cNvSpPr>
+          <p:nvPr>
+            <p:ph sz="quarter" idx="4"/>
+          </p:nvPr>
+        </p:nvSpPr>
+        <p:spPr/>
+        <p:txBody>
+          <a:bodyPr/>
+          <a:lstStyle/>
+          <a:p>
+            <a:r>
+              <a:rPr lang="en-IN" sz="3200" dirty="0" smtClean="0"/>
+              <a:t>For Extracting the files to the machines</a:t>
+            </a:r>
+            <a:r>
+              <a:rPr lang="en-IN" sz="3200" dirty="0" smtClean="0"/>
+              <a:t>.</a:t>
+            </a:r>
+          </a:p>
+          <a:p>
+            <a:endParaRPr lang="en-US" dirty="0"/>
           </a:p>
         </p:txBody>
       </p:sp>
     </p:spTree>
-    <p:extLst>
-      <p:ext uri="{BB962C8B-B14F-4D97-AF65-F5344CB8AC3E}">
-        <p14:creationId xmlns:p14="http://schemas.microsoft.com/office/powerpoint/2010/main" val="3024468845"/>
-      </p:ext>
-    </p:extLst>
   </p:cSld>
   <p:clrMapOvr>
     <a:masterClrMapping/>
   </p:clrMapOvr>
+  <p:timing>
+    <p:tnLst>
+      <p:par>
+        <p:cTn id="1" dur="indefinite" restart="never" nodeType="tmRoot"/>
+      </p:par>
+    </p:tnLst>
+  </p:timing>
 </p:sld>
 </file>
 
@@ -6937,7 +7216,7 @@
           <p:cNvPr id="2" name="Title 1">
             <a:extLst>
               <a:ext uri="{FF2B5EF4-FFF2-40B4-BE49-F238E27FC236}">
-                <a16:creationId xmlns:a16="http://schemas.microsoft.com/office/drawing/2014/main" id="{57A12D72-EF72-DB45-FD38-D87E35FE0188}"/>
+                <a16:creationId xmlns:a16="http://schemas.microsoft.com/office/drawing/2014/main" xmlns="" id="{66CF5B8C-9BF0-14D4-CEEA-78EB0684B6AA}"/>
               </a:ext>
             </a:extLst>
           </p:cNvPr>
@@ -6957,41 +7236,75 @@
           </a:p>
         </p:txBody>
       </p:sp>
-      <p:sp>
-        <p:nvSpPr>
-          <p:cNvPr id="3" name="Content Placeholder 2">
-            <a:extLst>
-              <a:ext uri="{FF2B5EF4-FFF2-40B4-BE49-F238E27FC236}">
-                <a16:creationId xmlns:a16="http://schemas.microsoft.com/office/drawing/2014/main" id="{7FBFED8F-4965-495F-B5C6-E8C5B0B0B576}"/>
-              </a:ext>
-            </a:extLst>
-          </p:cNvPr>
-          <p:cNvSpPr>
-            <a:spLocks noGrp="1"/>
-          </p:cNvSpPr>
+      <p:pic>
+        <p:nvPicPr>
+          <p:cNvPr id="4" name="Content Placeholder 3" descr="Git-PUSH-pULL-1280x640.png"/>
+          <p:cNvPicPr>
+            <a:picLocks noGrp="1" noChangeAspect="1"/>
+          </p:cNvPicPr>
           <p:nvPr>
             <p:ph idx="1"/>
           </p:nvPr>
-        </p:nvSpPr>
-        <p:spPr/>
-        <p:txBody>
-          <a:bodyPr/>
-          <a:lstStyle/>
-          <a:p>
-            <a:endParaRPr lang="en-IN"/>
-          </a:p>
-        </p:txBody>
-      </p:sp>
+        </p:nvPicPr>
+        <p:blipFill>
+          <a:blip r:embed="rId2"/>
+          <a:stretch>
+            <a:fillRect/>
+          </a:stretch>
+        </p:blipFill>
+        <p:spPr>
+          <a:xfrm>
+            <a:off x="786229" y="844061"/>
+            <a:ext cx="10540852" cy="5270427"/>
+          </a:xfrm>
+          <a:prstGeom prst="rect">
+            <a:avLst/>
+          </a:prstGeom>
+          <a:ln w="190500" cap="sq">
+            <a:solidFill>
+              <a:srgbClr val="C8C6BD"/>
+            </a:solidFill>
+            <a:prstDash val="solid"/>
+            <a:miter lim="800000"/>
+          </a:ln>
+          <a:effectLst>
+            <a:outerShdw blurRad="254000" algn="bl" rotWithShape="0">
+              <a:srgbClr val="000000">
+                <a:alpha val="43000"/>
+              </a:srgbClr>
+            </a:outerShdw>
+          </a:effectLst>
+          <a:scene3d>
+            <a:camera prst="perspectiveFront" fov="5400000"/>
+            <a:lightRig rig="threePt" dir="t">
+              <a:rot lat="0" lon="0" rev="2100000"/>
+            </a:lightRig>
+          </a:scene3d>
+          <a:sp3d extrusionH="25400">
+            <a:bevelT w="304800" h="152400" prst="hardEdge"/>
+            <a:extrusionClr>
+              <a:srgbClr val="000000"/>
+            </a:extrusionClr>
+          </a:sp3d>
+        </p:spPr>
+      </p:pic>
     </p:spTree>
     <p:extLst>
       <p:ext uri="{BB962C8B-B14F-4D97-AF65-F5344CB8AC3E}">
-        <p14:creationId xmlns:p14="http://schemas.microsoft.com/office/powerpoint/2010/main" val="379019145"/>
+        <p14:creationId xmlns:p14="http://schemas.microsoft.com/office/powerpoint/2010/main" xmlns="" val="3024468845"/>
       </p:ext>
     </p:extLst>
   </p:cSld>
   <p:clrMapOvr>
     <a:masterClrMapping/>
   </p:clrMapOvr>
+  <p:timing>
+    <p:tnLst>
+      <p:par>
+        <p:cTn id="1" dur="indefinite" restart="never" nodeType="tmRoot"/>
+      </p:par>
+    </p:tnLst>
+  </p:timing>
 </p:sld>
 </file>
 
@@ -7014,13 +7327,7 @@
       </p:grpSpPr>
       <p:sp>
         <p:nvSpPr>
-          <p:cNvPr id="2" name="Title 1">
-            <a:extLst>
-              <a:ext uri="{FF2B5EF4-FFF2-40B4-BE49-F238E27FC236}">
-                <a16:creationId xmlns:a16="http://schemas.microsoft.com/office/drawing/2014/main" id="{7C0B7ADC-ADAA-4C95-9EC2-2D123477BD64}"/>
-              </a:ext>
-            </a:extLst>
-          </p:cNvPr>
+          <p:cNvPr id="2" name="Title 1"/>
           <p:cNvSpPr>
             <a:spLocks noGrp="1"/>
           </p:cNvSpPr>
@@ -7028,50 +7335,60 @@
             <p:ph type="title"/>
           </p:nvPr>
         </p:nvSpPr>
-        <p:spPr/>
+        <p:spPr>
+          <a:xfrm>
+            <a:off x="1210996" y="349086"/>
+            <a:ext cx="9601196" cy="1303867"/>
+          </a:xfrm>
+        </p:spPr>
         <p:txBody>
           <a:bodyPr/>
           <a:lstStyle/>
           <a:p>
-            <a:endParaRPr lang="en-IN"/>
-          </a:p>
-        </p:txBody>
-      </p:sp>
-      <p:sp>
-        <p:nvSpPr>
-          <p:cNvPr id="3" name="Content Placeholder 2">
-            <a:extLst>
-              <a:ext uri="{FF2B5EF4-FFF2-40B4-BE49-F238E27FC236}">
-                <a16:creationId xmlns:a16="http://schemas.microsoft.com/office/drawing/2014/main" id="{623A4B43-CD8D-E588-A3CC-253A7C2C620C}"/>
-              </a:ext>
-            </a:extLst>
-          </p:cNvPr>
-          <p:cNvSpPr>
-            <a:spLocks noGrp="1"/>
-          </p:cNvSpPr>
+            <a:r>
+              <a:rPr lang="en-US" dirty="0" smtClean="0"/>
+              <a:t>Python Codes For Calculator</a:t>
+            </a:r>
+            <a:endParaRPr lang="en-US" dirty="0"/>
+          </a:p>
+        </p:txBody>
+      </p:sp>
+      <p:pic>
+        <p:nvPicPr>
+          <p:cNvPr id="4" name="Content Placeholder 3" descr="Screenshot (14).png"/>
+          <p:cNvPicPr>
+            <a:picLocks noGrp="1" noChangeAspect="1"/>
+          </p:cNvPicPr>
           <p:nvPr>
             <p:ph idx="1"/>
           </p:nvPr>
-        </p:nvSpPr>
-        <p:spPr/>
-        <p:txBody>
-          <a:bodyPr/>
-          <a:lstStyle/>
-          <a:p>
-            <a:endParaRPr lang="en-IN"/>
-          </a:p>
-        </p:txBody>
-      </p:sp>
+        </p:nvPicPr>
+        <p:blipFill>
+          <a:blip r:embed="rId2"/>
+          <a:srcRect l="13251" t="19357" b="6647"/>
+          <a:stretch>
+            <a:fillRect/>
+          </a:stretch>
+        </p:blipFill>
+        <p:spPr>
+          <a:xfrm>
+            <a:off x="745587" y="1378633"/>
+            <a:ext cx="10677379" cy="4712677"/>
+          </a:xfrm>
+        </p:spPr>
+      </p:pic>
     </p:spTree>
-    <p:extLst>
-      <p:ext uri="{BB962C8B-B14F-4D97-AF65-F5344CB8AC3E}">
-        <p14:creationId xmlns:p14="http://schemas.microsoft.com/office/powerpoint/2010/main" val="2892361523"/>
-      </p:ext>
-    </p:extLst>
   </p:cSld>
   <p:clrMapOvr>
     <a:masterClrMapping/>
   </p:clrMapOvr>
+  <p:timing>
+    <p:tnLst>
+      <p:par>
+        <p:cTn id="1" dur="indefinite" restart="never" nodeType="tmRoot"/>
+      </p:par>
+    </p:tnLst>
+  </p:timing>
 </p:sld>
 </file>
 
@@ -7097,7 +7414,7 @@
           <p:cNvPr id="2" name="Title 1">
             <a:extLst>
               <a:ext uri="{FF2B5EF4-FFF2-40B4-BE49-F238E27FC236}">
-                <a16:creationId xmlns:a16="http://schemas.microsoft.com/office/drawing/2014/main" id="{7C554504-91FF-63AA-4C6D-54BD40E3BED0}"/>
+                <a16:creationId xmlns:a16="http://schemas.microsoft.com/office/drawing/2014/main" xmlns="" id="{57A12D72-EF72-DB45-FD38-D87E35FE0188}"/>
               </a:ext>
             </a:extLst>
           </p:cNvPr>
@@ -7110,48 +7427,60 @@
         </p:nvSpPr>
         <p:spPr/>
         <p:txBody>
-          <a:bodyPr/>
-          <a:lstStyle/>
-          <a:p>
-            <a:endParaRPr lang="en-IN"/>
-          </a:p>
-        </p:txBody>
-      </p:sp>
-      <p:sp>
-        <p:nvSpPr>
-          <p:cNvPr id="3" name="Content Placeholder 2">
-            <a:extLst>
-              <a:ext uri="{FF2B5EF4-FFF2-40B4-BE49-F238E27FC236}">
-                <a16:creationId xmlns:a16="http://schemas.microsoft.com/office/drawing/2014/main" id="{F7CB79D9-9E2A-5D56-C60E-A2363F73C77A}"/>
-              </a:ext>
-            </a:extLst>
-          </p:cNvPr>
-          <p:cNvSpPr>
-            <a:spLocks noGrp="1"/>
-          </p:cNvSpPr>
+          <a:bodyPr>
+            <a:noAutofit/>
+          </a:bodyPr>
+          <a:lstStyle/>
+          <a:p>
+            <a:r>
+              <a:rPr lang="en-IN" sz="8000" b="1" dirty="0" smtClean="0"/>
+              <a:t>Use Of Code Editor</a:t>
+            </a:r>
+            <a:endParaRPr lang="en-IN" sz="8000" b="1" dirty="0"/>
+          </a:p>
+        </p:txBody>
+      </p:sp>
+      <p:pic>
+        <p:nvPicPr>
+          <p:cNvPr id="4" name="Content Placeholder 3" descr="WhatsApp Image 2023-05-22 at 07.39.40.jpeg"/>
+          <p:cNvPicPr>
+            <a:picLocks noGrp="1" noChangeAspect="1"/>
+          </p:cNvPicPr>
           <p:nvPr>
             <p:ph idx="1"/>
           </p:nvPr>
-        </p:nvSpPr>
-        <p:spPr/>
-        <p:txBody>
-          <a:bodyPr/>
-          <a:lstStyle/>
-          <a:p>
-            <a:endParaRPr lang="en-IN"/>
-          </a:p>
-        </p:txBody>
-      </p:sp>
+        </p:nvPicPr>
+        <p:blipFill>
+          <a:blip r:embed="rId2"/>
+          <a:srcRect t="30676" b="32534"/>
+          <a:stretch>
+            <a:fillRect/>
+          </a:stretch>
+        </p:blipFill>
+        <p:spPr>
+          <a:xfrm>
+            <a:off x="2447778" y="2447778"/>
+            <a:ext cx="7146389" cy="3722705"/>
+          </a:xfrm>
+        </p:spPr>
+      </p:pic>
     </p:spTree>
     <p:extLst>
       <p:ext uri="{BB962C8B-B14F-4D97-AF65-F5344CB8AC3E}">
-        <p14:creationId xmlns:p14="http://schemas.microsoft.com/office/powerpoint/2010/main" val="3939918763"/>
+        <p14:creationId xmlns:p14="http://schemas.microsoft.com/office/powerpoint/2010/main" xmlns="" val="379019145"/>
       </p:ext>
     </p:extLst>
   </p:cSld>
   <p:clrMapOvr>
     <a:masterClrMapping/>
   </p:clrMapOvr>
+  <p:timing>
+    <p:tnLst>
+      <p:par>
+        <p:cTn id="1" dur="indefinite" restart="never" nodeType="tmRoot"/>
+      </p:par>
+    </p:tnLst>
+  </p:timing>
 </p:sld>
 </file>
 
@@ -7198,7 +7527,7 @@
     </a:clrScheme>
     <a:fontScheme name="Organic">
       <a:majorFont>
-        <a:latin typeface="Garamond" panose="02020404030301010803"/>
+        <a:latin typeface="Garamond"/>
         <a:ea typeface=""/>
         <a:cs typeface=""/>
         <a:font script="Jpan" typeface="ＭＳ Ｐゴシック"/>
@@ -7233,7 +7562,7 @@
         <a:font script="Geor" typeface="Sylfaen"/>
       </a:majorFont>
       <a:minorFont>
-        <a:latin typeface="Garamond" panose="02020404030301010803"/>
+        <a:latin typeface="Garamond"/>
         <a:ea typeface=""/>
         <a:cs typeface=""/>
         <a:font script="Jpan" typeface="ＭＳ Ｐ明朝"/>
@@ -7382,7 +7711,7 @@
   <a:extraClrSchemeLst/>
   <a:extLst>
     <a:ext uri="{05A4C25C-085E-4340-85A3-A5531E510DB2}">
-      <thm15:themeFamily xmlns:thm15="http://schemas.microsoft.com/office/thememl/2012/main" name="Organic" id="{28CDC826-8792-45C0-861B-85EB3ADEDA33}" vid="{7DAC20F1-423D-49E2-BD0B-50532748BAD0}"/>
+      <thm15:themeFamily xmlns:thm15="http://schemas.microsoft.com/office/thememl/2012/main" xmlns="" name="Organic" id="{28CDC826-8792-45C0-861B-85EB3ADEDA33}" vid="{7DAC20F1-423D-49E2-BD0B-50532748BAD0}"/>
     </a:ext>
   </a:extLst>
 </a:theme>

</xml_diff>

<commit_message>
SOME CHANGES IN PPT
</commit_message>
<xml_diff>
--- a/ppt github.pptx
+++ b/ppt github.pptx
@@ -11,12 +11,13 @@
     <p:sldId id="258" r:id="rId5"/>
     <p:sldId id="269" r:id="rId6"/>
     <p:sldId id="259" r:id="rId7"/>
-    <p:sldId id="268" r:id="rId8"/>
-    <p:sldId id="261" r:id="rId9"/>
-    <p:sldId id="267" r:id="rId10"/>
-    <p:sldId id="262" r:id="rId11"/>
-    <p:sldId id="263" r:id="rId12"/>
-    <p:sldId id="264" r:id="rId13"/>
+    <p:sldId id="271" r:id="rId8"/>
+    <p:sldId id="268" r:id="rId9"/>
+    <p:sldId id="261" r:id="rId10"/>
+    <p:sldId id="267" r:id="rId11"/>
+    <p:sldId id="262" r:id="rId12"/>
+    <p:sldId id="263" r:id="rId13"/>
+    <p:sldId id="264" r:id="rId14"/>
   </p:sldIdLst>
   <p:sldSz cx="12192000" cy="6858000"/>
   <p:notesSz cx="6858000" cy="9144000"/>
@@ -126,6 +127,7 @@
             <p14:sldId id="258"/>
             <p14:sldId id="269"/>
             <p14:sldId id="259"/>
+            <p14:sldId id="271"/>
             <p14:sldId id="268"/>
             <p14:sldId id="261"/>
             <p14:sldId id="267"/>
@@ -137,7 +139,7 @@
       </p14:sectionLst>
     </p:ext>
     <p:ext uri="{EFAFB233-063F-42B5-8137-9DF3F51BA10A}">
-      <p15:sldGuideLst xmlns:p15="http://schemas.microsoft.com/office/powerpoint/2012/main">
+      <p15:sldGuideLst xmlns:p15="http://schemas.microsoft.com/office/powerpoint/2012/main" xmlns="">
         <p15:guide id="1" orient="horz" pos="2160">
           <p15:clr>
             <a:srgbClr val="A4A3A4"/>
@@ -909,7 +911,7 @@
             <a:fld id="{B79ABB67-168E-4905-8090-49366666A8FD}" type="datetimeFigureOut">
               <a:rPr lang="en-IN" smtClean="0"/>
               <a:pPr/>
-              <a:t>22-05-2023</a:t>
+              <a:t>23-05-2023</a:t>
             </a:fld>
             <a:endParaRPr lang="en-IN"/>
           </a:p>
@@ -1235,7 +1237,7 @@
             <a:fld id="{B79ABB67-168E-4905-8090-49366666A8FD}" type="datetimeFigureOut">
               <a:rPr lang="en-IN" smtClean="0"/>
               <a:pPr/>
-              <a:t>22-05-2023</a:t>
+              <a:t>23-05-2023</a:t>
             </a:fld>
             <a:endParaRPr lang="en-IN"/>
           </a:p>
@@ -1485,7 +1487,7 @@
             <a:fld id="{B79ABB67-168E-4905-8090-49366666A8FD}" type="datetimeFigureOut">
               <a:rPr lang="en-IN" smtClean="0"/>
               <a:pPr/>
-              <a:t>22-05-2023</a:t>
+              <a:t>23-05-2023</a:t>
             </a:fld>
             <a:endParaRPr lang="en-IN"/>
           </a:p>
@@ -1826,7 +1828,7 @@
             <a:fld id="{B79ABB67-168E-4905-8090-49366666A8FD}" type="datetimeFigureOut">
               <a:rPr lang="en-IN" smtClean="0"/>
               <a:pPr/>
-              <a:t>22-05-2023</a:t>
+              <a:t>23-05-2023</a:t>
             </a:fld>
             <a:endParaRPr lang="en-IN"/>
           </a:p>
@@ -2175,7 +2177,7 @@
             <a:fld id="{B79ABB67-168E-4905-8090-49366666A8FD}" type="datetimeFigureOut">
               <a:rPr lang="en-IN" smtClean="0"/>
               <a:pPr/>
-              <a:t>22-05-2023</a:t>
+              <a:t>23-05-2023</a:t>
             </a:fld>
             <a:endParaRPr lang="en-IN"/>
           </a:p>
@@ -2551,7 +2553,7 @@
             <a:fld id="{B79ABB67-168E-4905-8090-49366666A8FD}" type="datetimeFigureOut">
               <a:rPr lang="en-IN" smtClean="0"/>
               <a:pPr/>
-              <a:t>22-05-2023</a:t>
+              <a:t>23-05-2023</a:t>
             </a:fld>
             <a:endParaRPr lang="en-IN"/>
           </a:p>
@@ -3023,7 +3025,7 @@
             <a:fld id="{B79ABB67-168E-4905-8090-49366666A8FD}" type="datetimeFigureOut">
               <a:rPr lang="en-IN" smtClean="0"/>
               <a:pPr/>
-              <a:t>22-05-2023</a:t>
+              <a:t>23-05-2023</a:t>
             </a:fld>
             <a:endParaRPr lang="en-IN"/>
           </a:p>
@@ -3230,7 +3232,7 @@
             <a:fld id="{B79ABB67-168E-4905-8090-49366666A8FD}" type="datetimeFigureOut">
               <a:rPr lang="en-IN" smtClean="0"/>
               <a:pPr/>
-              <a:t>22-05-2023</a:t>
+              <a:t>23-05-2023</a:t>
             </a:fld>
             <a:endParaRPr lang="en-IN"/>
           </a:p>
@@ -3443,7 +3445,7 @@
             <a:fld id="{B79ABB67-168E-4905-8090-49366666A8FD}" type="datetimeFigureOut">
               <a:rPr lang="en-IN" smtClean="0"/>
               <a:pPr/>
-              <a:t>22-05-2023</a:t>
+              <a:t>23-05-2023</a:t>
             </a:fld>
             <a:endParaRPr lang="en-IN"/>
           </a:p>
@@ -3677,7 +3679,7 @@
             <a:fld id="{B79ABB67-168E-4905-8090-49366666A8FD}" type="datetimeFigureOut">
               <a:rPr lang="en-IN" smtClean="0"/>
               <a:pPr/>
-              <a:t>22-05-2023</a:t>
+              <a:t>23-05-2023</a:t>
             </a:fld>
             <a:endParaRPr lang="en-IN"/>
           </a:p>
@@ -3927,7 +3929,7 @@
             <a:fld id="{B79ABB67-168E-4905-8090-49366666A8FD}" type="datetimeFigureOut">
               <a:rPr lang="en-IN" smtClean="0"/>
               <a:pPr/>
-              <a:t>22-05-2023</a:t>
+              <a:t>23-05-2023</a:t>
             </a:fld>
             <a:endParaRPr lang="en-IN"/>
           </a:p>
@@ -4227,7 +4229,7 @@
             <a:fld id="{B79ABB67-168E-4905-8090-49366666A8FD}" type="datetimeFigureOut">
               <a:rPr lang="en-IN" smtClean="0"/>
               <a:pPr/>
-              <a:t>22-05-2023</a:t>
+              <a:t>23-05-2023</a:t>
             </a:fld>
             <a:endParaRPr lang="en-IN"/>
           </a:p>
@@ -4623,7 +4625,7 @@
             <a:fld id="{B79ABB67-168E-4905-8090-49366666A8FD}" type="datetimeFigureOut">
               <a:rPr lang="en-IN" smtClean="0"/>
               <a:pPr/>
-              <a:t>22-05-2023</a:t>
+              <a:t>23-05-2023</a:t>
             </a:fld>
             <a:endParaRPr lang="en-IN"/>
           </a:p>
@@ -4774,7 +4776,7 @@
             <a:fld id="{B79ABB67-168E-4905-8090-49366666A8FD}" type="datetimeFigureOut">
               <a:rPr lang="en-IN" smtClean="0"/>
               <a:pPr/>
-              <a:t>22-05-2023</a:t>
+              <a:t>23-05-2023</a:t>
             </a:fld>
             <a:endParaRPr lang="en-IN"/>
           </a:p>
@@ -4902,7 +4904,7 @@
             <a:fld id="{B79ABB67-168E-4905-8090-49366666A8FD}" type="datetimeFigureOut">
               <a:rPr lang="en-IN" smtClean="0"/>
               <a:pPr/>
-              <a:t>22-05-2023</a:t>
+              <a:t>23-05-2023</a:t>
             </a:fld>
             <a:endParaRPr lang="en-IN"/>
           </a:p>
@@ -5159,7 +5161,7 @@
             <a:fld id="{B79ABB67-168E-4905-8090-49366666A8FD}" type="datetimeFigureOut">
               <a:rPr lang="en-IN" smtClean="0"/>
               <a:pPr/>
-              <a:t>22-05-2023</a:t>
+              <a:t>23-05-2023</a:t>
             </a:fld>
             <a:endParaRPr lang="en-IN"/>
           </a:p>
@@ -5476,7 +5478,7 @@
             <a:fld id="{B79ABB67-168E-4905-8090-49366666A8FD}" type="datetimeFigureOut">
               <a:rPr lang="en-IN" smtClean="0"/>
               <a:pPr/>
-              <a:t>22-05-2023</a:t>
+              <a:t>23-05-2023</a:t>
             </a:fld>
             <a:endParaRPr lang="en-IN"/>
           </a:p>
@@ -5829,7 +5831,7 @@
             <a:fld id="{B79ABB67-168E-4905-8090-49366666A8FD}" type="datetimeFigureOut">
               <a:rPr lang="en-IN" smtClean="0"/>
               <a:pPr/>
-              <a:t>22-05-2023</a:t>
+              <a:t>23-05-2023</a:t>
             </a:fld>
             <a:endParaRPr lang="en-IN"/>
           </a:p>
@@ -6378,7 +6380,7 @@
           <p:cNvPr id="2" name="Title 1">
             <a:extLst>
               <a:ext uri="{FF2B5EF4-FFF2-40B4-BE49-F238E27FC236}">
-                <a16:creationId xmlns:a16="http://schemas.microsoft.com/office/drawing/2014/main" id="{F1285650-C0F7-EA6B-AACA-9981DC4F427C}"/>
+                <a16:creationId xmlns:a16="http://schemas.microsoft.com/office/drawing/2014/main" xmlns="" id="{F1285650-C0F7-EA6B-AACA-9981DC4F427C}"/>
               </a:ext>
             </a:extLst>
           </p:cNvPr>
@@ -6415,7 +6417,7 @@
           <p:cNvPr id="3" name="Subtitle 2">
             <a:extLst>
               <a:ext uri="{FF2B5EF4-FFF2-40B4-BE49-F238E27FC236}">
-                <a16:creationId xmlns:a16="http://schemas.microsoft.com/office/drawing/2014/main" id="{C440133A-1D16-A506-D514-0DD055432130}"/>
+                <a16:creationId xmlns:a16="http://schemas.microsoft.com/office/drawing/2014/main" xmlns="" id="{C440133A-1D16-A506-D514-0DD055432130}"/>
               </a:ext>
             </a:extLst>
           </p:cNvPr>
@@ -6471,18 +6473,16 @@
   <p:clrMapOvr>
     <a:masterClrMapping/>
   </p:clrMapOvr>
-  <mc:AlternateContent xmlns:mc="http://schemas.openxmlformats.org/markup-compatibility/2006" xmlns:p15="http://schemas.microsoft.com/office/powerpoint/2012/main">
-    <mc:Choice Requires="p15">
-      <p:transition xmlns:p14="http://schemas.microsoft.com/office/powerpoint/2010/main" spd="slow" p14:dur="6000">
-        <p15:prstTrans prst="curtains"/>
-      </p:transition>
-    </mc:Choice>
-    <mc:Fallback xmlns="">
-      <p:transition spd="slow">
-        <p:fade/>
-      </p:transition>
-    </mc:Fallback>
-  </mc:AlternateContent>
+  <p:transition spd="slow">
+    <p:fade/>
+  </p:transition>
+  <p:timing>
+    <p:tnLst>
+      <p:par>
+        <p:cTn id="1" dur="indefinite" restart="never" nodeType="tmRoot"/>
+      </p:par>
+    </p:tnLst>
+  </p:timing>
 </p:sld>
 </file>
 
@@ -6505,10 +6505,140 @@
       </p:grpSpPr>
       <p:sp>
         <p:nvSpPr>
+          <p:cNvPr id="2" name="Title 1"/>
+          <p:cNvSpPr>
+            <a:spLocks noGrp="1"/>
+          </p:cNvSpPr>
+          <p:nvPr>
+            <p:ph type="title"/>
+          </p:nvPr>
+        </p:nvSpPr>
+        <p:spPr>
+          <a:xfrm>
+            <a:off x="1210996" y="349086"/>
+            <a:ext cx="9601196" cy="1303867"/>
+          </a:xfrm>
+        </p:spPr>
+        <p:txBody>
+          <a:bodyPr/>
+          <a:lstStyle/>
+          <a:p>
+            <a:r>
+              <a:rPr lang="en-US" dirty="0"/>
+              <a:t>Python Codes For Calculator</a:t>
+            </a:r>
+          </a:p>
+        </p:txBody>
+      </p:sp>
+      <p:pic>
+        <p:nvPicPr>
+          <p:cNvPr id="4" name="Content Placeholder 3" descr="Screenshot (14).png"/>
+          <p:cNvPicPr>
+            <a:picLocks noGrp="1" noChangeAspect="1"/>
+          </p:cNvPicPr>
+          <p:nvPr>
+            <p:ph idx="1"/>
+          </p:nvPr>
+        </p:nvPicPr>
+        <p:blipFill>
+          <a:blip r:embed="rId2"/>
+          <a:srcRect l="13251" t="19357" b="6647"/>
+          <a:stretch>
+            <a:fillRect/>
+          </a:stretch>
+        </p:blipFill>
+        <p:spPr>
+          <a:xfrm>
+            <a:off x="745587" y="1378633"/>
+            <a:ext cx="10677379" cy="4712677"/>
+          </a:xfrm>
+        </p:spPr>
+      </p:pic>
+      <p:sp>
+        <p:nvSpPr>
+          <p:cNvPr id="3" name="TextBox 2">
+            <a:extLst>
+              <a:ext uri="{FF2B5EF4-FFF2-40B4-BE49-F238E27FC236}">
+                <a16:creationId xmlns:a16="http://schemas.microsoft.com/office/drawing/2014/main" xmlns="" id="{661F6F53-BAD8-B916-8F57-99065209EE22}"/>
+              </a:ext>
+            </a:extLst>
+          </p:cNvPr>
+          <p:cNvSpPr txBox="1"/>
+          <p:nvPr/>
+        </p:nvSpPr>
+        <p:spPr>
+          <a:xfrm>
+            <a:off x="10196051" y="2241755"/>
+            <a:ext cx="383438" cy="369332"/>
+          </a:xfrm>
+          <a:prstGeom prst="rect">
+            <a:avLst/>
+          </a:prstGeom>
+          <a:noFill/>
+        </p:spPr>
+        <p:txBody>
+          <a:bodyPr wrap="none" rtlCol="0">
+            <a:spAutoFit/>
+          </a:bodyPr>
+          <a:lstStyle/>
+          <a:p>
+            <a:r>
+              <a:rPr lang="en-IN" dirty="0"/>
+              <a:t>**</a:t>
+            </a:r>
+          </a:p>
+        </p:txBody>
+      </p:sp>
+    </p:spTree>
+  </p:cSld>
+  <p:clrMapOvr>
+    <a:masterClrMapping/>
+  </p:clrMapOvr>
+  <mc:AlternateContent xmlns:mc="http://schemas.openxmlformats.org/markup-compatibility/2006" xmlns:p14="http://schemas.microsoft.com/office/powerpoint/2010/main">
+    <mc:Choice Requires="p14">
+      <p:transition spd="slow" p14:dur="1200">
+        <p:dissolve/>
+      </p:transition>
+    </mc:Choice>
+    <mc:Fallback xmlns="">
+      <p:transition spd="slow">
+        <p:dissolve/>
+      </p:transition>
+    </mc:Fallback>
+  </mc:AlternateContent>
+  <p:timing>
+    <p:tnLst>
+      <p:par>
+        <p:cTn id="1" dur="indefinite" restart="never" nodeType="tmRoot"/>
+      </p:par>
+    </p:tnLst>
+  </p:timing>
+</p:sld>
+</file>
+
+<file path=ppt/slides/slide11.xml><?xml version="1.0" encoding="utf-8"?>
+<p:sld xmlns:a="http://schemas.openxmlformats.org/drawingml/2006/main" xmlns:r="http://schemas.openxmlformats.org/officeDocument/2006/relationships" xmlns:p="http://schemas.openxmlformats.org/presentationml/2006/main">
+  <p:cSld>
+    <p:spTree>
+      <p:nvGrpSpPr>
+        <p:cNvPr id="1" name=""/>
+        <p:cNvGrpSpPr/>
+        <p:nvPr/>
+      </p:nvGrpSpPr>
+      <p:grpSpPr>
+        <a:xfrm>
+          <a:off x="0" y="0"/>
+          <a:ext cx="0" cy="0"/>
+          <a:chOff x="0" y="0"/>
+          <a:chExt cx="0" cy="0"/>
+        </a:xfrm>
+      </p:grpSpPr>
+      <p:sp>
+        <p:nvSpPr>
           <p:cNvPr id="2" name="Title 1">
             <a:extLst>
               <a:ext uri="{FF2B5EF4-FFF2-40B4-BE49-F238E27FC236}">
-                <a16:creationId xmlns:a16="http://schemas.microsoft.com/office/drawing/2014/main" id="{57A12D72-EF72-DB45-FD38-D87E35FE0188}"/>
+                <a16:creationId xmlns:a16="http://schemas.microsoft.com/office/drawing/2014/main" xmlns="" id="{57A12D72-EF72-DB45-FD38-D87E35FE0188}"/>
               </a:ext>
             </a:extLst>
           </p:cNvPr>
@@ -6543,7 +6673,7 @@
           <p:cNvPr id="9" name="Content Placeholder 8">
             <a:extLst>
               <a:ext uri="{FF2B5EF4-FFF2-40B4-BE49-F238E27FC236}">
-                <a16:creationId xmlns:a16="http://schemas.microsoft.com/office/drawing/2014/main" id="{562C6521-946D-0BCB-1B8B-FC6E0D196952}"/>
+                <a16:creationId xmlns:a16="http://schemas.microsoft.com/office/drawing/2014/main" xmlns="" id="{562C6521-946D-0BCB-1B8B-FC6E0D196952}"/>
               </a:ext>
             </a:extLst>
           </p:cNvPr>
@@ -6595,10 +6725,17 @@
       </p:transition>
     </mc:Fallback>
   </mc:AlternateContent>
+  <p:timing>
+    <p:tnLst>
+      <p:par>
+        <p:cTn id="1" dur="indefinite" restart="never" nodeType="tmRoot"/>
+      </p:par>
+    </p:tnLst>
+  </p:timing>
 </p:sld>
 </file>
 
-<file path=ppt/slides/slide11.xml><?xml version="1.0" encoding="utf-8"?>
+<file path=ppt/slides/slide12.xml><?xml version="1.0" encoding="utf-8"?>
 <p:sld xmlns:a="http://schemas.openxmlformats.org/drawingml/2006/main" xmlns:r="http://schemas.openxmlformats.org/officeDocument/2006/relationships" xmlns:p="http://schemas.openxmlformats.org/presentationml/2006/main">
   <p:cSld>
     <p:spTree>
@@ -6620,7 +6757,7 @@
           <p:cNvPr id="2" name="Title 1">
             <a:extLst>
               <a:ext uri="{FF2B5EF4-FFF2-40B4-BE49-F238E27FC236}">
-                <a16:creationId xmlns:a16="http://schemas.microsoft.com/office/drawing/2014/main" id="{7C0B7ADC-ADAA-4C95-9EC2-2D123477BD64}"/>
+                <a16:creationId xmlns:a16="http://schemas.microsoft.com/office/drawing/2014/main" xmlns="" id="{7C0B7ADC-ADAA-4C95-9EC2-2D123477BD64}"/>
               </a:ext>
             </a:extLst>
           </p:cNvPr>
@@ -6695,10 +6832,17 @@
       </p:transition>
     </mc:Fallback>
   </mc:AlternateContent>
+  <p:timing>
+    <p:tnLst>
+      <p:par>
+        <p:cTn id="1" dur="indefinite" restart="never" nodeType="tmRoot"/>
+      </p:par>
+    </p:tnLst>
+  </p:timing>
 </p:sld>
 </file>
 
-<file path=ppt/slides/slide12.xml><?xml version="1.0" encoding="utf-8"?>
+<file path=ppt/slides/slide13.xml><?xml version="1.0" encoding="utf-8"?>
 <p:sld xmlns:a="http://schemas.openxmlformats.org/drawingml/2006/main" xmlns:r="http://schemas.openxmlformats.org/officeDocument/2006/relationships" xmlns:p="http://schemas.openxmlformats.org/presentationml/2006/main">
   <p:cSld>
     <p:spTree>
@@ -6720,7 +6864,7 @@
           <p:cNvPr id="2" name="Title 1">
             <a:extLst>
               <a:ext uri="{FF2B5EF4-FFF2-40B4-BE49-F238E27FC236}">
-                <a16:creationId xmlns:a16="http://schemas.microsoft.com/office/drawing/2014/main" id="{7C554504-91FF-63AA-4C6D-54BD40E3BED0}"/>
+                <a16:creationId xmlns:a16="http://schemas.microsoft.com/office/drawing/2014/main" xmlns="" id="{7C554504-91FF-63AA-4C6D-54BD40E3BED0}"/>
               </a:ext>
             </a:extLst>
           </p:cNvPr>
@@ -6741,6 +6885,10 @@
             <a:r>
               <a:rPr lang="en-IN" sz="4900" b="1" dirty="0"/>
               <a:t>Thank You </a:t>
+            </a:r>
+            <a:r>
+              <a:rPr lang="en-IN" b="1" dirty="0"/>
+              <a:t/>
             </a:r>
             <a:br>
               <a:rPr lang="en-IN" b="1" dirty="0"/>
@@ -6784,18 +6932,16 @@
   <p:clrMapOvr>
     <a:masterClrMapping/>
   </p:clrMapOvr>
-  <mc:AlternateContent xmlns:mc="http://schemas.openxmlformats.org/markup-compatibility/2006" xmlns:p15="http://schemas.microsoft.com/office/powerpoint/2012/main">
-    <mc:Choice Requires="p15">
-      <p:transition xmlns:p14="http://schemas.microsoft.com/office/powerpoint/2010/main" spd="slow" p14:dur="2000">
-        <p15:prstTrans prst="fallOver"/>
-      </p:transition>
-    </mc:Choice>
-    <mc:Fallback xmlns="">
-      <p:transition spd="slow">
-        <p:fade/>
-      </p:transition>
-    </mc:Fallback>
-  </mc:AlternateContent>
+  <p:transition spd="slow">
+    <p:fade/>
+  </p:transition>
+  <p:timing>
+    <p:tnLst>
+      <p:par>
+        <p:cTn id="1" dur="indefinite" restart="never" nodeType="tmRoot"/>
+      </p:par>
+    </p:tnLst>
+  </p:timing>
 </p:sld>
 </file>
 
@@ -6821,7 +6967,7 @@
           <p:cNvPr id="2" name="Title 1">
             <a:extLst>
               <a:ext uri="{FF2B5EF4-FFF2-40B4-BE49-F238E27FC236}">
-                <a16:creationId xmlns:a16="http://schemas.microsoft.com/office/drawing/2014/main" id="{7CD7DF8C-0F9E-52EC-CA71-87C2C5BE3DD7}"/>
+                <a16:creationId xmlns:a16="http://schemas.microsoft.com/office/drawing/2014/main" xmlns="" id="{7CD7DF8C-0F9E-52EC-CA71-87C2C5BE3DD7}"/>
               </a:ext>
             </a:extLst>
           </p:cNvPr>
@@ -6851,7 +6997,7 @@
           <p:cNvPr id="5" name="Content Placeholder 4">
             <a:extLst>
               <a:ext uri="{FF2B5EF4-FFF2-40B4-BE49-F238E27FC236}">
-                <a16:creationId xmlns:a16="http://schemas.microsoft.com/office/drawing/2014/main" id="{B7EABBA8-F31F-CF1A-7AB6-B219897FF1FD}"/>
+                <a16:creationId xmlns:a16="http://schemas.microsoft.com/office/drawing/2014/main" xmlns="" id="{B7EABBA8-F31F-CF1A-7AB6-B219897FF1FD}"/>
               </a:ext>
             </a:extLst>
           </p:cNvPr>
@@ -6894,6 +7040,13 @@
   <p:transition spd="slow">
     <p:wheel spokes="1"/>
   </p:transition>
+  <p:timing>
+    <p:tnLst>
+      <p:par>
+        <p:cTn id="1" dur="indefinite" restart="never" nodeType="tmRoot"/>
+      </p:par>
+    </p:tnLst>
+  </p:timing>
 </p:sld>
 </file>
 
@@ -6919,7 +7072,7 @@
           <p:cNvPr id="2" name="Title 1">
             <a:extLst>
               <a:ext uri="{FF2B5EF4-FFF2-40B4-BE49-F238E27FC236}">
-                <a16:creationId xmlns:a16="http://schemas.microsoft.com/office/drawing/2014/main" id="{AAB53573-6DAA-3B57-D4A2-8E6157B73845}"/>
+                <a16:creationId xmlns:a16="http://schemas.microsoft.com/office/drawing/2014/main" xmlns="" id="{AAB53573-6DAA-3B57-D4A2-8E6157B73845}"/>
               </a:ext>
             </a:extLst>
           </p:cNvPr>
@@ -6952,7 +7105,7 @@
           <p:cNvPr id="3" name="Content Placeholder 2">
             <a:extLst>
               <a:ext uri="{FF2B5EF4-FFF2-40B4-BE49-F238E27FC236}">
-                <a16:creationId xmlns:a16="http://schemas.microsoft.com/office/drawing/2014/main" id="{706DDD91-D1D0-9BD5-D5AB-71A0DB4E5F33}"/>
+                <a16:creationId xmlns:a16="http://schemas.microsoft.com/office/drawing/2014/main" xmlns="" id="{706DDD91-D1D0-9BD5-D5AB-71A0DB4E5F33}"/>
               </a:ext>
             </a:extLst>
           </p:cNvPr>
@@ -6991,7 +7144,7 @@
           <p:cNvPr id="5" name="Picture 4">
             <a:extLst>
               <a:ext uri="{FF2B5EF4-FFF2-40B4-BE49-F238E27FC236}">
-                <a16:creationId xmlns:a16="http://schemas.microsoft.com/office/drawing/2014/main" id="{7BE041F6-0472-CE31-DE9F-9E0E8A7645CA}"/>
+                <a16:creationId xmlns:a16="http://schemas.microsoft.com/office/drawing/2014/main" xmlns="" id="{7BE041F6-0472-CE31-DE9F-9E0E8A7645CA}"/>
               </a:ext>
             </a:extLst>
           </p:cNvPr>
@@ -7008,13 +7161,13 @@
               </a:ext>
             </a:extLst>
           </a:blip>
-          <a:srcRect t="9214" b="4968"/>
+          <a:srcRect l="31440" t="42461" r="1512" b="6764"/>
           <a:stretch/>
         </p:blipFill>
         <p:spPr>
           <a:xfrm>
-            <a:off x="1697810" y="2517058"/>
-            <a:ext cx="8460851" cy="3647768"/>
+            <a:off x="1489166" y="2452633"/>
+            <a:ext cx="9104811" cy="3686910"/>
           </a:xfrm>
           <a:prstGeom prst="rect">
             <a:avLst/>
@@ -7031,18 +7184,16 @@
   <p:clrMapOvr>
     <a:masterClrMapping/>
   </p:clrMapOvr>
-  <mc:AlternateContent xmlns:mc="http://schemas.openxmlformats.org/markup-compatibility/2006" xmlns:p15="http://schemas.microsoft.com/office/powerpoint/2012/main">
-    <mc:Choice Requires="p15">
-      <p:transition xmlns:p14="http://schemas.microsoft.com/office/powerpoint/2010/main" spd="slow" p14:dur="1250">
-        <p15:prstTrans prst="airplane"/>
-      </p:transition>
-    </mc:Choice>
-    <mc:Fallback xmlns="">
-      <p:transition spd="slow">
-        <p:fade/>
-      </p:transition>
-    </mc:Fallback>
-  </mc:AlternateContent>
+  <p:transition spd="slow">
+    <p:fade/>
+  </p:transition>
+  <p:timing>
+    <p:tnLst>
+      <p:par>
+        <p:cTn id="1" dur="indefinite" restart="never" nodeType="tmRoot"/>
+      </p:par>
+    </p:tnLst>
+  </p:timing>
 </p:sld>
 </file>
 
@@ -7068,7 +7219,7 @@
           <p:cNvPr id="2" name="Title 1">
             <a:extLst>
               <a:ext uri="{FF2B5EF4-FFF2-40B4-BE49-F238E27FC236}">
-                <a16:creationId xmlns:a16="http://schemas.microsoft.com/office/drawing/2014/main" id="{8E264C81-0323-AD6B-722A-DC9B5CD0DD8A}"/>
+                <a16:creationId xmlns:a16="http://schemas.microsoft.com/office/drawing/2014/main" xmlns="" id="{8E264C81-0323-AD6B-722A-DC9B5CD0DD8A}"/>
               </a:ext>
             </a:extLst>
           </p:cNvPr>
@@ -7106,17 +7257,15 @@
             <p:ph idx="1"/>
           </p:nvPr>
         </p:nvPicPr>
-        <p:blipFill>
+        <p:blipFill rotWithShape="1">
           <a:blip r:embed="rId2"/>
-          <a:srcRect l="4362" t="10046" r="18791" b="16115"/>
-          <a:stretch>
-            <a:fillRect/>
-          </a:stretch>
+          <a:srcRect l="12917" t="8176" r="23429" b="41627"/>
+          <a:stretch/>
         </p:blipFill>
         <p:spPr>
           <a:xfrm>
-            <a:off x="534571" y="1617785"/>
-            <a:ext cx="11141613" cy="4698609"/>
+            <a:off x="796835" y="1777700"/>
+            <a:ext cx="10685416" cy="4440220"/>
           </a:xfrm>
         </p:spPr>
       </p:pic>
@@ -7130,18 +7279,16 @@
   <p:clrMapOvr>
     <a:masterClrMapping/>
   </p:clrMapOvr>
-  <mc:AlternateContent xmlns:mc="http://schemas.openxmlformats.org/markup-compatibility/2006" xmlns:p15="http://schemas.microsoft.com/office/powerpoint/2012/main">
-    <mc:Choice Requires="p15">
-      <p:transition xmlns:p14="http://schemas.microsoft.com/office/powerpoint/2010/main" spd="slow" p14:dur="3250">
-        <p15:prstTrans prst="origami"/>
-      </p:transition>
-    </mc:Choice>
-    <mc:Fallback xmlns="">
-      <p:transition spd="slow">
-        <p:fade/>
-      </p:transition>
-    </mc:Fallback>
-  </mc:AlternateContent>
+  <p:transition spd="slow">
+    <p:fade/>
+  </p:transition>
+  <p:timing>
+    <p:tnLst>
+      <p:par>
+        <p:cTn id="1" dur="indefinite" restart="never" nodeType="tmRoot"/>
+      </p:par>
+    </p:tnLst>
+  </p:timing>
 </p:sld>
 </file>
 
@@ -7191,17 +7338,15 @@
             <p:ph idx="1"/>
           </p:nvPr>
         </p:nvPicPr>
-        <p:blipFill>
+        <p:blipFill rotWithShape="1">
           <a:blip r:embed="rId2"/>
-          <a:srcRect l="4339" t="8914" r="17480" b="12644"/>
-          <a:stretch>
-            <a:fillRect/>
-          </a:stretch>
+          <a:srcRect l="10061" t="38732" r="51386" b="28630"/>
+          <a:stretch/>
         </p:blipFill>
         <p:spPr>
           <a:xfrm>
-            <a:off x="689317" y="703386"/>
-            <a:ext cx="10750186" cy="5331654"/>
+            <a:off x="770709" y="836024"/>
+            <a:ext cx="10698480" cy="5094513"/>
           </a:xfrm>
         </p:spPr>
       </p:pic>
@@ -7222,6 +7367,13 @@
       </p:transition>
     </mc:Fallback>
   </mc:AlternateContent>
+  <p:timing>
+    <p:tnLst>
+      <p:par>
+        <p:cTn id="1" dur="indefinite" restart="never" nodeType="tmRoot"/>
+      </p:par>
+    </p:tnLst>
+  </p:timing>
 </p:sld>
 </file>
 
@@ -7247,7 +7399,7 @@
           <p:cNvPr id="2" name="Title 1">
             <a:extLst>
               <a:ext uri="{FF2B5EF4-FFF2-40B4-BE49-F238E27FC236}">
-                <a16:creationId xmlns:a16="http://schemas.microsoft.com/office/drawing/2014/main" id="{521D9A83-F614-B6F7-9348-303ED48B60A9}"/>
+                <a16:creationId xmlns:a16="http://schemas.microsoft.com/office/drawing/2014/main" xmlns="" id="{521D9A83-F614-B6F7-9348-303ED48B60A9}"/>
               </a:ext>
             </a:extLst>
           </p:cNvPr>
@@ -7280,7 +7432,7 @@
           <p:cNvPr id="3" name="Content Placeholder 2">
             <a:extLst>
               <a:ext uri="{FF2B5EF4-FFF2-40B4-BE49-F238E27FC236}">
-                <a16:creationId xmlns:a16="http://schemas.microsoft.com/office/drawing/2014/main" id="{BE95639E-7018-12D3-79CB-83CB53763EFB}"/>
+                <a16:creationId xmlns:a16="http://schemas.microsoft.com/office/drawing/2014/main" xmlns="" id="{BE95639E-7018-12D3-79CB-83CB53763EFB}"/>
               </a:ext>
             </a:extLst>
           </p:cNvPr>
@@ -7309,8 +7461,13 @@
           <a:p>
             <a:r>
               <a:rPr lang="en-IN" dirty="0"/>
-              <a:t>Git add . – For adding a file in local repository</a:t>
-            </a:r>
+              <a:t>Git add . – For adding a </a:t>
+            </a:r>
+            <a:r>
+              <a:rPr lang="en-IN" dirty="0" smtClean="0"/>
+              <a:t>files and folders in directory</a:t>
+            </a:r>
+            <a:endParaRPr lang="en-IN" dirty="0"/>
           </a:p>
           <a:p>
             <a:r>
@@ -7363,6 +7520,13 @@
       </p:transition>
     </mc:Fallback>
   </mc:AlternateContent>
+  <p:timing>
+    <p:tnLst>
+      <p:par>
+        <p:cTn id="1" dur="indefinite" restart="never" nodeType="tmRoot"/>
+      </p:par>
+    </p:tnLst>
+  </p:timing>
 </p:sld>
 </file>
 
@@ -7393,173 +7557,73 @@
             <p:ph type="title"/>
           </p:nvPr>
         </p:nvSpPr>
-        <p:spPr/>
+        <p:spPr>
+          <a:xfrm>
+            <a:off x="1360716" y="355114"/>
+            <a:ext cx="9601196" cy="1303867"/>
+          </a:xfrm>
+        </p:spPr>
         <p:txBody>
           <a:bodyPr/>
           <a:lstStyle/>
           <a:p>
             <a:r>
-              <a:rPr lang="en-US" b="1" dirty="0"/>
-              <a:t>Use Of </a:t>
-            </a:r>
-            <a:r>
-              <a:rPr lang="en-US" b="1" dirty="0" err="1"/>
-              <a:t>Git</a:t>
-            </a:r>
-            <a:r>
-              <a:rPr lang="en-US" b="1" dirty="0"/>
-              <a:t> Push And </a:t>
-            </a:r>
-            <a:r>
-              <a:rPr lang="en-US" b="1" dirty="0" err="1"/>
-              <a:t>Git</a:t>
-            </a:r>
-            <a:r>
-              <a:rPr lang="en-US" b="1" dirty="0"/>
-              <a:t> Pull</a:t>
-            </a:r>
-          </a:p>
-        </p:txBody>
-      </p:sp>
-      <p:sp>
-        <p:nvSpPr>
-          <p:cNvPr id="3" name="Text Placeholder 2"/>
-          <p:cNvSpPr>
-            <a:spLocks noGrp="1"/>
-          </p:cNvSpPr>
-          <p:nvPr>
-            <p:ph type="body" idx="1"/>
-          </p:nvPr>
-        </p:nvSpPr>
-        <p:spPr>
-          <a:xfrm>
-            <a:off x="1295400" y="2461585"/>
-            <a:ext cx="4718304" cy="576262"/>
-          </a:xfrm>
-        </p:spPr>
-        <p:txBody>
-          <a:bodyPr/>
-          <a:lstStyle/>
-          <a:p>
-            <a:r>
-              <a:rPr lang="en-US" sz="3200" b="1" dirty="0" err="1"/>
-              <a:t>Git</a:t>
-            </a:r>
-            <a:r>
-              <a:rPr lang="en-US" sz="3200" b="1" dirty="0"/>
-              <a:t> Push</a:t>
-            </a:r>
-          </a:p>
-        </p:txBody>
-      </p:sp>
-      <p:sp>
-        <p:nvSpPr>
+              <a:rPr lang="en-US" b="1" dirty="0" err="1" smtClean="0"/>
+              <a:t>Commited</a:t>
+            </a:r>
+            <a:r>
+              <a:rPr lang="en-US" b="1" dirty="0" smtClean="0"/>
+              <a:t> Files and folders</a:t>
+            </a:r>
+            <a:endParaRPr lang="en-US" b="1" dirty="0"/>
+          </a:p>
+        </p:txBody>
+      </p:sp>
+      <p:pic>
+        <p:nvPicPr>
           <p:cNvPr id="4" name="Content Placeholder 3"/>
-          <p:cNvSpPr>
-            <a:spLocks noGrp="1"/>
-          </p:cNvSpPr>
-          <p:nvPr>
-            <p:ph sz="half" idx="2"/>
-          </p:nvPr>
-        </p:nvSpPr>
-        <p:spPr/>
-        <p:txBody>
-          <a:bodyPr>
-            <a:normAutofit/>
-          </a:bodyPr>
-          <a:lstStyle/>
-          <a:p>
-            <a:r>
-              <a:rPr lang="en-IN" sz="2800" dirty="0"/>
-              <a:t> </a:t>
-            </a:r>
-            <a:r>
-              <a:rPr lang="en-IN" sz="3200" dirty="0"/>
-              <a:t>For uploading the file from local repository to master repository.</a:t>
-            </a:r>
-            <a:endParaRPr lang="en-IN" sz="2800" dirty="0"/>
-          </a:p>
-          <a:p>
-            <a:pPr>
-              <a:buNone/>
-            </a:pPr>
-            <a:endParaRPr lang="en-US" sz="2800" dirty="0"/>
-          </a:p>
-        </p:txBody>
-      </p:sp>
-      <p:sp>
-        <p:nvSpPr>
-          <p:cNvPr id="5" name="Text Placeholder 4"/>
-          <p:cNvSpPr>
-            <a:spLocks noGrp="1"/>
-          </p:cNvSpPr>
-          <p:nvPr>
-            <p:ph type="body" sz="quarter" idx="3"/>
-          </p:nvPr>
-        </p:nvSpPr>
-        <p:spPr>
-          <a:xfrm>
-            <a:off x="6166603" y="2489720"/>
-            <a:ext cx="4718304" cy="576262"/>
-          </a:xfrm>
-        </p:spPr>
-        <p:txBody>
-          <a:bodyPr/>
-          <a:lstStyle/>
-          <a:p>
-            <a:r>
-              <a:rPr lang="en-US" sz="3200" b="1" dirty="0" err="1"/>
-              <a:t>Git</a:t>
-            </a:r>
-            <a:r>
-              <a:rPr lang="en-US" sz="3200" b="1" dirty="0"/>
-              <a:t> Pull</a:t>
-            </a:r>
-          </a:p>
-        </p:txBody>
-      </p:sp>
-      <p:sp>
-        <p:nvSpPr>
-          <p:cNvPr id="6" name="Content Placeholder 5"/>
-          <p:cNvSpPr>
-            <a:spLocks noGrp="1"/>
-          </p:cNvSpPr>
-          <p:nvPr>
-            <p:ph sz="quarter" idx="4"/>
-          </p:nvPr>
-        </p:nvSpPr>
-        <p:spPr/>
-        <p:txBody>
-          <a:bodyPr/>
-          <a:lstStyle/>
-          <a:p>
-            <a:r>
-              <a:rPr lang="en-IN" sz="3200" dirty="0"/>
-              <a:t>For Extracting the files to the machines.</a:t>
-            </a:r>
-          </a:p>
-          <a:p>
-            <a:endParaRPr lang="en-US" dirty="0"/>
-          </a:p>
-        </p:txBody>
-      </p:sp>
+          <p:cNvPicPr>
+            <a:picLocks noGrp="1" noChangeAspect="1"/>
+          </p:cNvPicPr>
+          <p:nvPr>
+            <p:ph idx="1"/>
+          </p:nvPr>
+        </p:nvPicPr>
+        <p:blipFill rotWithShape="1">
+          <a:blip r:embed="rId2">
+            <a:extLst>
+              <a:ext uri="{28A0092B-C50C-407E-A947-70E740481C1C}">
+                <a14:useLocalDpi xmlns:a14="http://schemas.microsoft.com/office/drawing/2010/main" val="0"/>
+              </a:ext>
+            </a:extLst>
+          </a:blip>
+          <a:srcRect l="13107" t="17802" r="11189" b="6211"/>
+          <a:stretch/>
+        </p:blipFill>
+        <p:spPr>
+          <a:xfrm>
+            <a:off x="836023" y="1720047"/>
+            <a:ext cx="10607040" cy="4419496"/>
+          </a:xfrm>
+        </p:spPr>
+      </p:pic>
     </p:spTree>
+    <p:extLst>
+      <p:ext uri="{BB962C8B-B14F-4D97-AF65-F5344CB8AC3E}">
+        <p14:creationId xmlns:p14="http://schemas.microsoft.com/office/powerpoint/2010/main" val="752175269"/>
+      </p:ext>
+    </p:extLst>
   </p:cSld>
   <p:clrMapOvr>
     <a:masterClrMapping/>
   </p:clrMapOvr>
-  <mc:AlternateContent xmlns:mc="http://schemas.openxmlformats.org/markup-compatibility/2006" xmlns:p15="http://schemas.microsoft.com/office/powerpoint/2012/main">
-    <mc:Choice Requires="p15">
-      <p:transition xmlns:p14="http://schemas.microsoft.com/office/powerpoint/2010/main" spd="slow" p14:dur="1250">
-        <p15:prstTrans prst="peelOff"/>
-      </p:transition>
-    </mc:Choice>
-    <mc:Fallback xmlns="">
-      <p:transition spd="slow">
-        <p:fade/>
-      </p:transition>
-    </mc:Fallback>
-  </mc:AlternateContent>
+  <p:timing>
+    <p:tnLst>
+      <p:par>
+        <p:cTn id="1" dur="indefinite" restart="never" nodeType="tmRoot"/>
+      </p:par>
+    </p:tnLst>
+  </p:timing>
 </p:sld>
 </file>
 
@@ -7582,10 +7646,211 @@
       </p:grpSpPr>
       <p:sp>
         <p:nvSpPr>
+          <p:cNvPr id="2" name="Title 1"/>
+          <p:cNvSpPr>
+            <a:spLocks noGrp="1"/>
+          </p:cNvSpPr>
+          <p:nvPr>
+            <p:ph type="title"/>
+          </p:nvPr>
+        </p:nvSpPr>
+        <p:spPr/>
+        <p:txBody>
+          <a:bodyPr/>
+          <a:lstStyle/>
+          <a:p>
+            <a:r>
+              <a:rPr lang="en-US" b="1" dirty="0"/>
+              <a:t>Use Of </a:t>
+            </a:r>
+            <a:r>
+              <a:rPr lang="en-US" b="1" dirty="0" err="1"/>
+              <a:t>Git</a:t>
+            </a:r>
+            <a:r>
+              <a:rPr lang="en-US" b="1" dirty="0"/>
+              <a:t> Push And </a:t>
+            </a:r>
+            <a:r>
+              <a:rPr lang="en-US" b="1" dirty="0" err="1"/>
+              <a:t>Git</a:t>
+            </a:r>
+            <a:r>
+              <a:rPr lang="en-US" b="1" dirty="0"/>
+              <a:t> Pull</a:t>
+            </a:r>
+          </a:p>
+        </p:txBody>
+      </p:sp>
+      <p:sp>
+        <p:nvSpPr>
+          <p:cNvPr id="3" name="Text Placeholder 2"/>
+          <p:cNvSpPr>
+            <a:spLocks noGrp="1"/>
+          </p:cNvSpPr>
+          <p:nvPr>
+            <p:ph type="body" idx="1"/>
+          </p:nvPr>
+        </p:nvSpPr>
+        <p:spPr>
+          <a:xfrm>
+            <a:off x="1295400" y="2461585"/>
+            <a:ext cx="4718304" cy="576262"/>
+          </a:xfrm>
+        </p:spPr>
+        <p:txBody>
+          <a:bodyPr/>
+          <a:lstStyle/>
+          <a:p>
+            <a:r>
+              <a:rPr lang="en-US" sz="3200" b="1" dirty="0" err="1"/>
+              <a:t>Git</a:t>
+            </a:r>
+            <a:r>
+              <a:rPr lang="en-US" sz="3200" b="1" dirty="0"/>
+              <a:t> Push</a:t>
+            </a:r>
+          </a:p>
+        </p:txBody>
+      </p:sp>
+      <p:sp>
+        <p:nvSpPr>
+          <p:cNvPr id="4" name="Content Placeholder 3"/>
+          <p:cNvSpPr>
+            <a:spLocks noGrp="1"/>
+          </p:cNvSpPr>
+          <p:nvPr>
+            <p:ph sz="half" idx="2"/>
+          </p:nvPr>
+        </p:nvSpPr>
+        <p:spPr/>
+        <p:txBody>
+          <a:bodyPr>
+            <a:normAutofit/>
+          </a:bodyPr>
+          <a:lstStyle/>
+          <a:p>
+            <a:r>
+              <a:rPr lang="en-IN" sz="2800" dirty="0"/>
+              <a:t> </a:t>
+            </a:r>
+            <a:r>
+              <a:rPr lang="en-IN" sz="3200" dirty="0"/>
+              <a:t>For uploading the file from local repository to master repository.</a:t>
+            </a:r>
+            <a:endParaRPr lang="en-IN" sz="2800" dirty="0"/>
+          </a:p>
+          <a:p>
+            <a:pPr>
+              <a:buNone/>
+            </a:pPr>
+            <a:endParaRPr lang="en-US" sz="2800" dirty="0"/>
+          </a:p>
+        </p:txBody>
+      </p:sp>
+      <p:sp>
+        <p:nvSpPr>
+          <p:cNvPr id="5" name="Text Placeholder 4"/>
+          <p:cNvSpPr>
+            <a:spLocks noGrp="1"/>
+          </p:cNvSpPr>
+          <p:nvPr>
+            <p:ph type="body" sz="quarter" idx="3"/>
+          </p:nvPr>
+        </p:nvSpPr>
+        <p:spPr>
+          <a:xfrm>
+            <a:off x="6166603" y="2489720"/>
+            <a:ext cx="4718304" cy="576262"/>
+          </a:xfrm>
+        </p:spPr>
+        <p:txBody>
+          <a:bodyPr/>
+          <a:lstStyle/>
+          <a:p>
+            <a:r>
+              <a:rPr lang="en-US" sz="3200" b="1" dirty="0" err="1"/>
+              <a:t>Git</a:t>
+            </a:r>
+            <a:r>
+              <a:rPr lang="en-US" sz="3200" b="1" dirty="0"/>
+              <a:t> Pull</a:t>
+            </a:r>
+          </a:p>
+        </p:txBody>
+      </p:sp>
+      <p:sp>
+        <p:nvSpPr>
+          <p:cNvPr id="6" name="Content Placeholder 5"/>
+          <p:cNvSpPr>
+            <a:spLocks noGrp="1"/>
+          </p:cNvSpPr>
+          <p:nvPr>
+            <p:ph sz="quarter" idx="4"/>
+          </p:nvPr>
+        </p:nvSpPr>
+        <p:spPr/>
+        <p:txBody>
+          <a:bodyPr/>
+          <a:lstStyle/>
+          <a:p>
+            <a:r>
+              <a:rPr lang="en-US" dirty="0"/>
+              <a:t>U</a:t>
+            </a:r>
+            <a:r>
+              <a:rPr lang="en-US" dirty="0" smtClean="0"/>
+              <a:t>sed </a:t>
+            </a:r>
+            <a:r>
+              <a:rPr lang="en-US" dirty="0"/>
+              <a:t>to fetch and download content from a remote repository and immediately update the local repository to match that content</a:t>
+            </a:r>
+            <a:endParaRPr lang="en-US" dirty="0"/>
+          </a:p>
+        </p:txBody>
+      </p:sp>
+    </p:spTree>
+  </p:cSld>
+  <p:clrMapOvr>
+    <a:masterClrMapping/>
+  </p:clrMapOvr>
+  <p:transition spd="slow">
+    <p:fade/>
+  </p:transition>
+  <p:timing>
+    <p:tnLst>
+      <p:par>
+        <p:cTn id="1" dur="indefinite" restart="never" nodeType="tmRoot"/>
+      </p:par>
+    </p:tnLst>
+  </p:timing>
+</p:sld>
+</file>
+
+<file path=ppt/slides/slide9.xml><?xml version="1.0" encoding="utf-8"?>
+<p:sld xmlns:a="http://schemas.openxmlformats.org/drawingml/2006/main" xmlns:r="http://schemas.openxmlformats.org/officeDocument/2006/relationships" xmlns:p="http://schemas.openxmlformats.org/presentationml/2006/main">
+  <p:cSld>
+    <p:spTree>
+      <p:nvGrpSpPr>
+        <p:cNvPr id="1" name=""/>
+        <p:cNvGrpSpPr/>
+        <p:nvPr/>
+      </p:nvGrpSpPr>
+      <p:grpSpPr>
+        <a:xfrm>
+          <a:off x="0" y="0"/>
+          <a:ext cx="0" cy="0"/>
+          <a:chOff x="0" y="0"/>
+          <a:chExt cx="0" cy="0"/>
+        </a:xfrm>
+      </p:grpSpPr>
+      <p:sp>
+        <p:nvSpPr>
           <p:cNvPr id="2" name="Title 1">
             <a:extLst>
               <a:ext uri="{FF2B5EF4-FFF2-40B4-BE49-F238E27FC236}">
-                <a16:creationId xmlns:a16="http://schemas.microsoft.com/office/drawing/2014/main" id="{66CF5B8C-9BF0-14D4-CEEA-78EB0684B6AA}"/>
+                <a16:creationId xmlns:a16="http://schemas.microsoft.com/office/drawing/2014/main" xmlns="" id="{66CF5B8C-9BF0-14D4-CEEA-78EB0684B6AA}"/>
               </a:ext>
             </a:extLst>
           </p:cNvPr>
@@ -7667,141 +7932,16 @@
   <p:clrMapOvr>
     <a:masterClrMapping/>
   </p:clrMapOvr>
-  <mc:AlternateContent xmlns:mc="http://schemas.openxmlformats.org/markup-compatibility/2006" xmlns:p15="http://schemas.microsoft.com/office/powerpoint/2012/main">
-    <mc:Choice Requires="p15">
-      <p:transition xmlns:p14="http://schemas.microsoft.com/office/powerpoint/2010/main" spd="slow" p14:dur="2000">
-        <p15:prstTrans prst="fracture"/>
-      </p:transition>
-    </mc:Choice>
-    <mc:Fallback xmlns="">
-      <p:transition spd="slow">
-        <p:fade/>
-      </p:transition>
-    </mc:Fallback>
-  </mc:AlternateContent>
-</p:sld>
-</file>
-
-<file path=ppt/slides/slide9.xml><?xml version="1.0" encoding="utf-8"?>
-<p:sld xmlns:a="http://schemas.openxmlformats.org/drawingml/2006/main" xmlns:r="http://schemas.openxmlformats.org/officeDocument/2006/relationships" xmlns:p="http://schemas.openxmlformats.org/presentationml/2006/main">
-  <p:cSld>
-    <p:spTree>
-      <p:nvGrpSpPr>
-        <p:cNvPr id="1" name=""/>
-        <p:cNvGrpSpPr/>
-        <p:nvPr/>
-      </p:nvGrpSpPr>
-      <p:grpSpPr>
-        <a:xfrm>
-          <a:off x="0" y="0"/>
-          <a:ext cx="0" cy="0"/>
-          <a:chOff x="0" y="0"/>
-          <a:chExt cx="0" cy="0"/>
-        </a:xfrm>
-      </p:grpSpPr>
-      <p:sp>
-        <p:nvSpPr>
-          <p:cNvPr id="2" name="Title 1"/>
-          <p:cNvSpPr>
-            <a:spLocks noGrp="1"/>
-          </p:cNvSpPr>
-          <p:nvPr>
-            <p:ph type="title"/>
-          </p:nvPr>
-        </p:nvSpPr>
-        <p:spPr>
-          <a:xfrm>
-            <a:off x="1210996" y="349086"/>
-            <a:ext cx="9601196" cy="1303867"/>
-          </a:xfrm>
-        </p:spPr>
-        <p:txBody>
-          <a:bodyPr/>
-          <a:lstStyle/>
-          <a:p>
-            <a:r>
-              <a:rPr lang="en-US" dirty="0"/>
-              <a:t>Python Codes For Calculator</a:t>
-            </a:r>
-          </a:p>
-        </p:txBody>
-      </p:sp>
-      <p:pic>
-        <p:nvPicPr>
-          <p:cNvPr id="4" name="Content Placeholder 3" descr="Screenshot (14).png"/>
-          <p:cNvPicPr>
-            <a:picLocks noGrp="1" noChangeAspect="1"/>
-          </p:cNvPicPr>
-          <p:nvPr>
-            <p:ph idx="1"/>
-          </p:nvPr>
-        </p:nvPicPr>
-        <p:blipFill>
-          <a:blip r:embed="rId2"/>
-          <a:srcRect l="13251" t="19357" b="6647"/>
-          <a:stretch>
-            <a:fillRect/>
-          </a:stretch>
-        </p:blipFill>
-        <p:spPr>
-          <a:xfrm>
-            <a:off x="745587" y="1378633"/>
-            <a:ext cx="10677379" cy="4712677"/>
-          </a:xfrm>
-        </p:spPr>
-      </p:pic>
-      <p:sp>
-        <p:nvSpPr>
-          <p:cNvPr id="3" name="TextBox 2">
-            <a:extLst>
-              <a:ext uri="{FF2B5EF4-FFF2-40B4-BE49-F238E27FC236}">
-                <a16:creationId xmlns:a16="http://schemas.microsoft.com/office/drawing/2014/main" id="{661F6F53-BAD8-B916-8F57-99065209EE22}"/>
-              </a:ext>
-            </a:extLst>
-          </p:cNvPr>
-          <p:cNvSpPr txBox="1"/>
-          <p:nvPr/>
-        </p:nvSpPr>
-        <p:spPr>
-          <a:xfrm>
-            <a:off x="10196051" y="2241755"/>
-            <a:ext cx="383438" cy="369332"/>
-          </a:xfrm>
-          <a:prstGeom prst="rect">
-            <a:avLst/>
-          </a:prstGeom>
-          <a:noFill/>
-        </p:spPr>
-        <p:txBody>
-          <a:bodyPr wrap="none" rtlCol="0">
-            <a:spAutoFit/>
-          </a:bodyPr>
-          <a:lstStyle/>
-          <a:p>
-            <a:r>
-              <a:rPr lang="en-IN" dirty="0"/>
-              <a:t>**</a:t>
-            </a:r>
-          </a:p>
-        </p:txBody>
-      </p:sp>
-    </p:spTree>
-  </p:cSld>
-  <p:clrMapOvr>
-    <a:masterClrMapping/>
-  </p:clrMapOvr>
-  <mc:AlternateContent xmlns:mc="http://schemas.openxmlformats.org/markup-compatibility/2006" xmlns:p14="http://schemas.microsoft.com/office/powerpoint/2010/main">
-    <mc:Choice Requires="p14">
-      <p:transition spd="slow" p14:dur="1200">
-        <p:dissolve/>
-      </p:transition>
-    </mc:Choice>
-    <mc:Fallback xmlns="">
-      <p:transition spd="slow">
-        <p:dissolve/>
-      </p:transition>
-    </mc:Fallback>
-  </mc:AlternateContent>
+  <p:transition spd="slow">
+    <p:fade/>
+  </p:transition>
+  <p:timing>
+    <p:tnLst>
+      <p:par>
+        <p:cTn id="1" dur="indefinite" restart="never" nodeType="tmRoot"/>
+      </p:par>
+    </p:tnLst>
+  </p:timing>
 </p:sld>
 </file>
 
@@ -7848,7 +7988,7 @@
     </a:clrScheme>
     <a:fontScheme name="Organic">
       <a:majorFont>
-        <a:latin typeface="Garamond" panose="02020404030301010803"/>
+        <a:latin typeface="Garamond"/>
         <a:ea typeface=""/>
         <a:cs typeface=""/>
         <a:font script="Jpan" typeface="ＭＳ Ｐゴシック"/>
@@ -7883,7 +8023,7 @@
         <a:font script="Geor" typeface="Sylfaen"/>
       </a:majorFont>
       <a:minorFont>
-        <a:latin typeface="Garamond" panose="02020404030301010803"/>
+        <a:latin typeface="Garamond"/>
         <a:ea typeface=""/>
         <a:cs typeface=""/>
         <a:font script="Jpan" typeface="ＭＳ Ｐ明朝"/>
@@ -8032,7 +8172,7 @@
   <a:extraClrSchemeLst/>
   <a:extLst>
     <a:ext uri="{05A4C25C-085E-4340-85A3-A5531E510DB2}">
-      <thm15:themeFamily xmlns:thm15="http://schemas.microsoft.com/office/thememl/2012/main" name="Organic" id="{28CDC826-8792-45C0-861B-85EB3ADEDA33}" vid="{7DAC20F1-423D-49E2-BD0B-50532748BAD0}"/>
+      <thm15:themeFamily xmlns:thm15="http://schemas.microsoft.com/office/thememl/2012/main" xmlns="" name="Organic" id="{28CDC826-8792-45C0-861B-85EB3ADEDA33}" vid="{7DAC20F1-423D-49E2-BD0B-50532748BAD0}"/>
     </a:ext>
   </a:extLst>
 </a:theme>

</xml_diff>